<commit_message>
add Hello world program explanation
</commit_message>
<xml_diff>
--- a/03. Programming Basics/Presentation/Data types and Operators.pptx
+++ b/03. Programming Basics/Presentation/Data types and Operators.pptx
@@ -5,19 +5,19 @@
     <p:sldMasterId id="2147483648" r:id="rId1"/>
   </p:sldMasterIdLst>
   <p:notesMasterIdLst>
-    <p:notesMasterId r:id="rId24"/>
+    <p:notesMasterId r:id="rId22"/>
   </p:notesMasterIdLst>
   <p:sldIdLst>
     <p:sldId id="371" r:id="rId2"/>
     <p:sldId id="321" r:id="rId3"/>
-    <p:sldId id="366" r:id="rId4"/>
-    <p:sldId id="342" r:id="rId5"/>
-    <p:sldId id="343" r:id="rId6"/>
-    <p:sldId id="344" r:id="rId7"/>
-    <p:sldId id="345" r:id="rId8"/>
-    <p:sldId id="346" r:id="rId9"/>
-    <p:sldId id="348" r:id="rId10"/>
-    <p:sldId id="350" r:id="rId11"/>
+    <p:sldId id="348" r:id="rId4"/>
+    <p:sldId id="350" r:id="rId5"/>
+    <p:sldId id="366" r:id="rId6"/>
+    <p:sldId id="342" r:id="rId7"/>
+    <p:sldId id="343" r:id="rId8"/>
+    <p:sldId id="344" r:id="rId9"/>
+    <p:sldId id="345" r:id="rId10"/>
+    <p:sldId id="346" r:id="rId11"/>
     <p:sldId id="353" r:id="rId12"/>
     <p:sldId id="370" r:id="rId13"/>
     <p:sldId id="369" r:id="rId14"/>
@@ -28,8 +28,6 @@
     <p:sldId id="355" r:id="rId19"/>
     <p:sldId id="356" r:id="rId20"/>
     <p:sldId id="357" r:id="rId21"/>
-    <p:sldId id="358" r:id="rId22"/>
-    <p:sldId id="363" r:id="rId23"/>
   </p:sldIdLst>
   <p:sldSz cx="12192000" cy="6858000"/>
   <p:notesSz cx="6858000" cy="9144000"/>
@@ -218,7 +216,7 @@
           <a:p>
             <a:fld id="{7387BF4C-1AC5-8047-9CB7-F6FE835C9ED7}" type="datetimeFigureOut">
               <a:rPr lang="en-US" smtClean="0"/>
-              <a:t>5/28/23</a:t>
+              <a:t>6/17/23</a:t>
             </a:fld>
             <a:endParaRPr lang="en-US"/>
           </a:p>
@@ -529,10 +527,7 @@
           <a:bodyPr/>
           <a:lstStyle/>
           <a:p>
-            <a:r>
-              <a:rPr lang="en-US" dirty="0"/>
-              <a:t>I don’t own the pictures in the presentation. Ownership goes to the original creators</a:t>
-            </a:r>
+            <a:endParaRPr lang="en-US" dirty="0"/>
           </a:p>
         </p:txBody>
       </p:sp>
@@ -678,64 +673,9 @@
                 <a:spcPct val="0"/>
               </a:spcBef>
             </a:pPr>
-            <a:r>
-              <a:rPr lang="en-US" altLang="en-US">
-                <a:ea typeface="ＭＳ Ｐゴシック" panose="020B0600070205080204" pitchFamily="34" charset="-128"/>
-              </a:rPr>
-              <a:t>System.out.println(Integer.toBinaryString(2 &lt;&lt; 1));</a:t>
-            </a:r>
-          </a:p>
-          <a:p>
-            <a:pPr eaLnBrk="1" hangingPunct="1">
-              <a:spcBef>
-                <a:spcPct val="0"/>
-              </a:spcBef>
-            </a:pPr>
-            <a:r>
-              <a:rPr lang="en-US" altLang="en-US">
-                <a:ea typeface="ＭＳ Ｐゴシック" panose="020B0600070205080204" pitchFamily="34" charset="-128"/>
-              </a:rPr>
-              <a:t>System.out.println(Integer.toBinaryString(2 &lt;&lt; 2));</a:t>
-            </a:r>
-          </a:p>
-          <a:p>
-            <a:pPr eaLnBrk="1" hangingPunct="1">
-              <a:spcBef>
-                <a:spcPct val="0"/>
-              </a:spcBef>
-            </a:pPr>
-            <a:r>
-              <a:rPr lang="en-US" altLang="en-US">
-                <a:ea typeface="ＭＳ Ｐゴシック" panose="020B0600070205080204" pitchFamily="34" charset="-128"/>
-              </a:rPr>
-              <a:t>System.out.println(Integer.toBinaryString(2 &lt;&lt; 3));</a:t>
-            </a:r>
-          </a:p>
-          <a:p>
-            <a:pPr eaLnBrk="1" hangingPunct="1">
-              <a:spcBef>
-                <a:spcPct val="0"/>
-              </a:spcBef>
-            </a:pPr>
-            <a:r>
-              <a:rPr lang="en-US" altLang="en-US">
-                <a:ea typeface="ＭＳ Ｐゴシック" panose="020B0600070205080204" pitchFamily="34" charset="-128"/>
-              </a:rPr>
-              <a:t>System.out.println(Integer.toBinaryString(2 &lt;&lt; 4));</a:t>
-            </a:r>
-          </a:p>
-          <a:p>
-            <a:pPr eaLnBrk="1" hangingPunct="1">
-              <a:spcBef>
-                <a:spcPct val="0"/>
-              </a:spcBef>
-            </a:pPr>
-            <a:r>
-              <a:rPr lang="en-US" altLang="en-US">
-                <a:ea typeface="ＭＳ Ｐゴシック" panose="020B0600070205080204" pitchFamily="34" charset="-128"/>
-              </a:rPr>
-              <a:t>System.out.println(Integer.toBinaryString(2 &lt;&lt; 5));</a:t>
-            </a:r>
+            <a:endParaRPr lang="en-US" altLang="en-US" dirty="0">
+              <a:ea typeface="ＭＳ Ｐゴシック" panose="020B0600070205080204" pitchFamily="34" charset="-128"/>
+            </a:endParaRPr>
           </a:p>
         </p:txBody>
       </p:sp>
@@ -1051,7 +991,7 @@
           <a:p>
             <a:fld id="{2BD33172-6DBD-0449-8823-A661FF4A9434}" type="datetime1">
               <a:rPr lang="en-US" smtClean="0"/>
-              <a:t>5/28/23</a:t>
+              <a:t>6/17/23</a:t>
             </a:fld>
             <a:endParaRPr lang="en-US"/>
           </a:p>
@@ -1252,7 +1192,7 @@
           <a:p>
             <a:fld id="{2E9CD58F-2FB5-3F42-8F7C-F4FDD372D4DF}" type="datetime1">
               <a:rPr lang="en-US" smtClean="0"/>
-              <a:t>5/28/23</a:t>
+              <a:t>6/17/23</a:t>
             </a:fld>
             <a:endParaRPr lang="en-US"/>
           </a:p>
@@ -1463,7 +1403,7 @@
           <a:p>
             <a:fld id="{EB1AB7DB-BA09-BF4E-BA04-7E87C78DE094}" type="datetime1">
               <a:rPr lang="en-US" smtClean="0"/>
-              <a:t>5/28/23</a:t>
+              <a:t>6/17/23</a:t>
             </a:fld>
             <a:endParaRPr lang="en-US"/>
           </a:p>
@@ -1664,7 +1604,7 @@
           <a:p>
             <a:fld id="{DF4BF83A-6A9E-884B-BF4A-3961B5A82CC1}" type="datetime1">
               <a:rPr lang="en-US" smtClean="0"/>
-              <a:t>5/28/23</a:t>
+              <a:t>6/17/23</a:t>
             </a:fld>
             <a:endParaRPr lang="en-US"/>
           </a:p>
@@ -1942,7 +1882,7 @@
           <a:p>
             <a:fld id="{10DD95FF-6B99-944F-98AD-ED6AA89A0224}" type="datetime1">
               <a:rPr lang="en-US" smtClean="0"/>
-              <a:t>5/28/23</a:t>
+              <a:t>6/17/23</a:t>
             </a:fld>
             <a:endParaRPr lang="en-US"/>
           </a:p>
@@ -2210,7 +2150,7 @@
           <a:p>
             <a:fld id="{36C33B4D-A0EF-9340-9FD6-FC97BDF37FF7}" type="datetime1">
               <a:rPr lang="en-US" smtClean="0"/>
-              <a:t>5/28/23</a:t>
+              <a:t>6/17/23</a:t>
             </a:fld>
             <a:endParaRPr lang="en-US"/>
           </a:p>
@@ -2625,7 +2565,7 @@
           <a:p>
             <a:fld id="{97C04BFC-F745-1841-834A-166C1A440CD8}" type="datetime1">
               <a:rPr lang="en-US" smtClean="0"/>
-              <a:t>5/28/23</a:t>
+              <a:t>6/17/23</a:t>
             </a:fld>
             <a:endParaRPr lang="en-US"/>
           </a:p>
@@ -2769,7 +2709,7 @@
           <a:p>
             <a:fld id="{51B5D433-ED6C-424E-A72A-B6E7A9ACFCCF}" type="datetime1">
               <a:rPr lang="en-US" smtClean="0"/>
-              <a:t>5/28/23</a:t>
+              <a:t>6/17/23</a:t>
             </a:fld>
             <a:endParaRPr lang="en-US"/>
           </a:p>
@@ -2885,7 +2825,7 @@
           <a:p>
             <a:fld id="{3B6FDFF5-9FEB-D14A-B5D6-83EE35619E3D}" type="datetime1">
               <a:rPr lang="en-US" smtClean="0"/>
-              <a:t>5/28/23</a:t>
+              <a:t>6/17/23</a:t>
             </a:fld>
             <a:endParaRPr lang="en-US"/>
           </a:p>
@@ -3199,7 +3139,7 @@
           <a:p>
             <a:fld id="{45A4F193-F095-3943-9794-A02B65D19BCE}" type="datetime1">
               <a:rPr lang="en-US" smtClean="0"/>
-              <a:t>5/28/23</a:t>
+              <a:t>6/17/23</a:t>
             </a:fld>
             <a:endParaRPr lang="en-US"/>
           </a:p>
@@ -3490,7 +3430,7 @@
           <a:p>
             <a:fld id="{2AD9858A-98B0-E84E-BDDC-E3A1122856FB}" type="datetime1">
               <a:rPr lang="en-US" smtClean="0"/>
-              <a:t>5/28/23</a:t>
+              <a:t>6/17/23</a:t>
             </a:fld>
             <a:endParaRPr lang="en-US"/>
           </a:p>
@@ -3737,7 +3677,7 @@
           <a:p>
             <a:fld id="{658EB262-7FE8-D346-8332-6A29835036CB}" type="datetime1">
               <a:rPr lang="en-US" smtClean="0"/>
-              <a:t>5/28/23</a:t>
+              <a:t>6/17/23</a:t>
             </a:fld>
             <a:endParaRPr lang="en-US"/>
           </a:p>
@@ -4217,10 +4157,10 @@
       </p:grpSpPr>
       <p:sp>
         <p:nvSpPr>
-          <p:cNvPr id="150530" name="Rectangle 2">
-            <a:extLst>
-              <a:ext uri="{FF2B5EF4-FFF2-40B4-BE49-F238E27FC236}">
-                <a16:creationId xmlns:a16="http://schemas.microsoft.com/office/drawing/2014/main" id="{A5E79B40-3EDA-4D58-AA66-05C5DCFA736F}"/>
+          <p:cNvPr id="146434" name="Rectangle 2">
+            <a:extLst>
+              <a:ext uri="{FF2B5EF4-FFF2-40B4-BE49-F238E27FC236}">
+                <a16:creationId xmlns:a16="http://schemas.microsoft.com/office/drawing/2014/main" id="{83D49567-A32A-13EB-69BD-5C9C851B9FDB}"/>
               </a:ext>
             </a:extLst>
           </p:cNvPr>
@@ -4239,20 +4179,18 @@
           <a:lstStyle/>
           <a:p>
             <a:r>
-              <a:rPr lang="en-US" altLang="en-US" dirty="0">
-                <a:latin typeface="Calibri" panose="020F0502020204030204" pitchFamily="34" charset="0"/>
-              </a:rPr>
-              <a:t>Declaring variables</a:t>
-            </a:r>
-          </a:p>
-        </p:txBody>
-      </p:sp>
-      <p:sp>
-        <p:nvSpPr>
-          <p:cNvPr id="150531" name="Rectangle 3">
-            <a:extLst>
-              <a:ext uri="{FF2B5EF4-FFF2-40B4-BE49-F238E27FC236}">
-                <a16:creationId xmlns:a16="http://schemas.microsoft.com/office/drawing/2014/main" id="{54B1DA22-3DB3-261B-AA34-B46CCC657D3D}"/>
+              <a:rPr lang="en-US" altLang="en-US" dirty="0"/>
+              <a:t>float</a:t>
+            </a:r>
+          </a:p>
+        </p:txBody>
+      </p:sp>
+      <p:sp>
+        <p:nvSpPr>
+          <p:cNvPr id="146435" name="Rectangle 3">
+            <a:extLst>
+              <a:ext uri="{FF2B5EF4-FFF2-40B4-BE49-F238E27FC236}">
+                <a16:creationId xmlns:a16="http://schemas.microsoft.com/office/drawing/2014/main" id="{3D67686E-1BE1-9B19-13B3-1128DEFBDA6F}"/>
               </a:ext>
             </a:extLst>
           </p:cNvPr>
@@ -4275,58 +4213,64 @@
               <a:buChar char="o"/>
             </a:pPr>
             <a:r>
-              <a:rPr lang="en-US" dirty="0">
-                <a:latin typeface="Calibri" panose="020F0502020204030204" pitchFamily="34" charset="0"/>
-              </a:rPr>
-              <a:t>You declare variables like this:</a:t>
-            </a:r>
-          </a:p>
-          <a:p>
-            <a:pPr lvl="1"/>
-            <a:r>
-              <a:rPr lang="en-US" dirty="0">
-                <a:latin typeface="Calibri" panose="020F0502020204030204" pitchFamily="34" charset="0"/>
-                <a:cs typeface="Calibri" panose="020F0502020204030204" pitchFamily="34" charset="0"/>
-              </a:rPr>
-              <a:t>int </a:t>
-            </a:r>
-            <a:r>
-              <a:rPr lang="en-US" dirty="0" err="1">
-                <a:latin typeface="Calibri" panose="020F0502020204030204" pitchFamily="34" charset="0"/>
-                <a:cs typeface="Calibri" panose="020F0502020204030204" pitchFamily="34" charset="0"/>
-              </a:rPr>
-              <a:t>classSize</a:t>
-            </a:r>
-            <a:r>
-              <a:rPr lang="en-US" dirty="0">
-                <a:latin typeface="Calibri" panose="020F0502020204030204" pitchFamily="34" charset="0"/>
-                <a:cs typeface="Calibri" panose="020F0502020204030204" pitchFamily="34" charset="0"/>
-              </a:rPr>
-              <a:t>;</a:t>
-            </a:r>
-          </a:p>
-          <a:p>
-            <a:pPr lvl="1"/>
-            <a:r>
-              <a:rPr lang="en-US" dirty="0">
-                <a:latin typeface="Calibri" panose="020F0502020204030204" pitchFamily="34" charset="0"/>
-                <a:cs typeface="Calibri" panose="020F0502020204030204" pitchFamily="34" charset="0"/>
-              </a:rPr>
-              <a:t>double </a:t>
-            </a:r>
-            <a:r>
-              <a:rPr lang="en-US" dirty="0" err="1">
-                <a:latin typeface="Calibri" panose="020F0502020204030204" pitchFamily="34" charset="0"/>
-                <a:cs typeface="Calibri" panose="020F0502020204030204" pitchFamily="34" charset="0"/>
-              </a:rPr>
-              <a:t>myBankBalance</a:t>
-            </a:r>
-            <a:r>
-              <a:rPr lang="en-US" dirty="0">
-                <a:latin typeface="Calibri" panose="020F0502020204030204" pitchFamily="34" charset="0"/>
-                <a:cs typeface="Calibri" panose="020F0502020204030204" pitchFamily="34" charset="0"/>
-              </a:rPr>
-              <a:t>;</a:t>
+              <a:rPr lang="en-US" altLang="en-US" b="1" dirty="0">
+                <a:latin typeface="Calibri" panose="020F0502020204030204" pitchFamily="34" charset="0"/>
+              </a:rPr>
+              <a:t>Float</a:t>
+            </a:r>
+            <a:r>
+              <a:rPr lang="en-US" altLang="en-US" dirty="0">
+                <a:latin typeface="Calibri" panose="020F0502020204030204" pitchFamily="34" charset="0"/>
+              </a:rPr>
+              <a:t> is the other kind of </a:t>
+            </a:r>
+            <a:r>
+              <a:rPr lang="ja-JP" altLang="en-US">
+                <a:latin typeface="Calibri" panose="020F0502020204030204" pitchFamily="34" charset="0"/>
+              </a:rPr>
+              <a:t>“</a:t>
+            </a:r>
+            <a:r>
+              <a:rPr lang="en-US" altLang="ja-JP" dirty="0">
+                <a:latin typeface="Calibri" panose="020F0502020204030204" pitchFamily="34" charset="0"/>
+              </a:rPr>
+              <a:t>real,</a:t>
+            </a:r>
+            <a:r>
+              <a:rPr lang="ja-JP" altLang="en-US">
+                <a:latin typeface="Calibri" panose="020F0502020204030204" pitchFamily="34" charset="0"/>
+              </a:rPr>
+              <a:t>”</a:t>
+            </a:r>
+            <a:r>
+              <a:rPr lang="en-US" altLang="ja-JP" dirty="0">
+                <a:latin typeface="Calibri" panose="020F0502020204030204" pitchFamily="34" charset="0"/>
+              </a:rPr>
+              <a:t> or </a:t>
+            </a:r>
+            <a:r>
+              <a:rPr lang="ja-JP" altLang="en-US">
+                <a:latin typeface="Calibri" panose="020F0502020204030204" pitchFamily="34" charset="0"/>
+              </a:rPr>
+              <a:t>“</a:t>
+            </a:r>
+            <a:r>
+              <a:rPr lang="en-US" altLang="ja-JP" dirty="0">
+                <a:latin typeface="Calibri" panose="020F0502020204030204" pitchFamily="34" charset="0"/>
+              </a:rPr>
+              <a:t>floating point</a:t>
+            </a:r>
+            <a:r>
+              <a:rPr lang="ja-JP" altLang="en-US">
+                <a:latin typeface="Calibri" panose="020F0502020204030204" pitchFamily="34" charset="0"/>
+              </a:rPr>
+              <a:t>”</a:t>
+            </a:r>
+            <a:r>
+              <a:rPr lang="en-US" altLang="ja-JP" dirty="0">
+                <a:latin typeface="Calibri" panose="020F0502020204030204" pitchFamily="34" charset="0"/>
+              </a:rPr>
+              <a:t> number</a:t>
             </a:r>
           </a:p>
           <a:p>
@@ -4335,70 +4279,35 @@
               <a:buChar char="o"/>
             </a:pPr>
             <a:r>
-              <a:rPr lang="en-US" dirty="0">
-                <a:latin typeface="Calibri" panose="020F0502020204030204" pitchFamily="34" charset="0"/>
-              </a:rPr>
-              <a:t>Initialize the variables like this:</a:t>
-            </a:r>
-          </a:p>
-          <a:p>
-            <a:pPr lvl="1"/>
-            <a:r>
-              <a:rPr lang="en-US" dirty="0" err="1">
-                <a:latin typeface="Calibri" panose="020F0502020204030204" pitchFamily="34" charset="0"/>
-                <a:cs typeface="Calibri" panose="020F0502020204030204" pitchFamily="34" charset="0"/>
-              </a:rPr>
-              <a:t>int</a:t>
-            </a:r>
-            <a:r>
-              <a:rPr lang="en-US" dirty="0">
-                <a:latin typeface="Calibri" panose="020F0502020204030204" pitchFamily="34" charset="0"/>
-                <a:cs typeface="Calibri" panose="020F0502020204030204" pitchFamily="34" charset="0"/>
-              </a:rPr>
-              <a:t> </a:t>
-            </a:r>
-            <a:r>
-              <a:rPr lang="en-US" dirty="0" err="1">
-                <a:latin typeface="Calibri" panose="020F0502020204030204" pitchFamily="34" charset="0"/>
-                <a:cs typeface="Calibri" panose="020F0502020204030204" pitchFamily="34" charset="0"/>
-              </a:rPr>
-              <a:t>classSize</a:t>
-            </a:r>
-            <a:r>
-              <a:rPr lang="en-US" dirty="0">
-                <a:latin typeface="Calibri" panose="020F0502020204030204" pitchFamily="34" charset="0"/>
-                <a:cs typeface="Calibri" panose="020F0502020204030204" pitchFamily="34" charset="0"/>
-              </a:rPr>
-              <a:t> = 100;</a:t>
-            </a:r>
-          </a:p>
-          <a:p>
-            <a:pPr lvl="1"/>
-            <a:r>
-              <a:rPr lang="en-US" dirty="0">
-                <a:latin typeface="Calibri" panose="020F0502020204030204" pitchFamily="34" charset="0"/>
-                <a:cs typeface="Calibri" panose="020F0502020204030204" pitchFamily="34" charset="0"/>
-              </a:rPr>
-              <a:t>double </a:t>
-            </a:r>
-            <a:r>
-              <a:rPr lang="en-US" dirty="0" err="1">
-                <a:latin typeface="Calibri" panose="020F0502020204030204" pitchFamily="34" charset="0"/>
-                <a:cs typeface="Calibri" panose="020F0502020204030204" pitchFamily="34" charset="0"/>
-              </a:rPr>
-              <a:t>myBankBalance</a:t>
-            </a:r>
-            <a:r>
-              <a:rPr lang="en-US" dirty="0">
-                <a:latin typeface="Calibri" panose="020F0502020204030204" pitchFamily="34" charset="0"/>
-                <a:cs typeface="Calibri" panose="020F0502020204030204" pitchFamily="34" charset="0"/>
-              </a:rPr>
-              <a:t> = 100;</a:t>
-            </a:r>
-          </a:p>
-          <a:p>
-            <a:pPr lvl="1"/>
-            <a:endParaRPr lang="en-US" dirty="0"/>
+              <a:rPr lang="en-US" altLang="en-US" dirty="0">
+                <a:latin typeface="Calibri" panose="020F0502020204030204" pitchFamily="34" charset="0"/>
+              </a:rPr>
+              <a:t>float has about 8 digits of accuracy</a:t>
+            </a:r>
+          </a:p>
+          <a:p>
+            <a:pPr>
+              <a:buFont typeface="Courier New" panose="02070309020205020404" pitchFamily="49" charset="0"/>
+              <a:buChar char="o"/>
+            </a:pPr>
+            <a:r>
+              <a:rPr lang="en-US" altLang="en-US" dirty="0">
+                <a:latin typeface="Calibri" panose="020F0502020204030204" pitchFamily="34" charset="0"/>
+              </a:rPr>
+              <a:t>Arithmetic with float is not faster</a:t>
+            </a:r>
+          </a:p>
+          <a:p>
+            <a:pPr>
+              <a:buFont typeface="Courier New" panose="02070309020205020404" pitchFamily="49" charset="0"/>
+              <a:buChar char="o"/>
+            </a:pPr>
+            <a:r>
+              <a:rPr lang="en-US" altLang="en-US" dirty="0">
+                <a:latin typeface="Calibri" panose="020F0502020204030204" pitchFamily="34" charset="0"/>
+              </a:rPr>
+              <a:t>Use float only to save space when there are millions of numbers involved</a:t>
+            </a:r>
           </a:p>
         </p:txBody>
       </p:sp>
@@ -4454,7 +4363,7 @@
               <a:rPr lang="en-US" altLang="en-US" dirty="0">
                 <a:latin typeface="Calibri" panose="020F0502020204030204" pitchFamily="34" charset="0"/>
               </a:rPr>
-              <a:t>Arithmetic</a:t>
+              <a:t>Arithmetic Operations</a:t>
             </a:r>
           </a:p>
         </p:txBody>
@@ -4632,7 +4541,7 @@
         <p:spPr/>
         <p:txBody>
           <a:bodyPr vert="horz" lIns="45720" tIns="45720" rIns="45720" bIns="45720" rtlCol="0">
-            <a:normAutofit fontScale="92500" lnSpcReduction="10000"/>
+            <a:normAutofit fontScale="92500" lnSpcReduction="20000"/>
           </a:bodyPr>
           <a:lstStyle/>
           <a:p>
@@ -4655,7 +4564,7 @@
             </a:pPr>
             <a:r>
               <a:rPr lang="en-US" dirty="0"/>
-              <a:t>&lt;     Less than 			(var1 &lt; var2)</a:t>
+              <a:t>&lt;     Less than 				(var1 &lt; var2)</a:t>
             </a:r>
           </a:p>
           <a:p>
@@ -4666,7 +4575,7 @@
             </a:pPr>
             <a:r>
               <a:rPr lang="en-US" dirty="0"/>
-              <a:t>&lt;=   Less than or equal to  		(var1 &lt;= var2)</a:t>
+              <a:t>&lt;=   Less than or equal to  			(var1 &lt;= var2)</a:t>
             </a:r>
           </a:p>
           <a:p>
@@ -4677,7 +4586,7 @@
             </a:pPr>
             <a:r>
               <a:rPr lang="en-US" dirty="0"/>
-              <a:t>&gt;      Greater than 		(var1 &gt; var2)</a:t>
+              <a:t>&gt;      Greater than 				(var1 &gt; var2)</a:t>
             </a:r>
           </a:p>
           <a:p>
@@ -4707,14 +4616,14 @@
             <a:pPr lvl="1"/>
             <a:r>
               <a:rPr lang="en-US" dirty="0"/>
-              <a:t>==  Test if equal			(var1 == var2)</a:t>
+              <a:t>==  Test if equal				(var1 == var2)</a:t>
             </a:r>
           </a:p>
           <a:p>
             <a:pPr lvl="1"/>
             <a:r>
               <a:rPr lang="en-US" dirty="0"/>
-              <a:t>!=    Test if not equal		(var1 != var2)</a:t>
+              <a:t>!=    Test if not equal			(var1 != var2)</a:t>
             </a:r>
           </a:p>
           <a:p>
@@ -4733,14 +4642,32 @@
             <a:pPr lvl="1"/>
             <a:r>
               <a:rPr lang="en-US" dirty="0"/>
-              <a:t>&amp;&amp; ((var1 == var2) &amp;&amp; (var3  != var4))</a:t>
+              <a:t>&amp;&amp; </a:t>
+            </a:r>
+          </a:p>
+          <a:p>
+            <a:pPr marL="457200" lvl="1" indent="0">
+              <a:buNone/>
+            </a:pPr>
+            <a:r>
+              <a:rPr lang="en-US" dirty="0"/>
+              <a:t>((var1 == var2) &amp;&amp; (var3  != var4))</a:t>
             </a:r>
           </a:p>
           <a:p>
             <a:pPr lvl="1"/>
             <a:r>
               <a:rPr lang="en-US" dirty="0"/>
-              <a:t>| | ((var1 == var2) ||  (var3 != var4))</a:t>
+              <a:t>| | </a:t>
+            </a:r>
+          </a:p>
+          <a:p>
+            <a:pPr marL="457200" lvl="1" indent="0">
+              <a:buNone/>
+            </a:pPr>
+            <a:r>
+              <a:rPr lang="en-US" dirty="0"/>
+              <a:t>((var1 == var2) ||  (var3 != var4))</a:t>
             </a:r>
           </a:p>
           <a:p>
@@ -4901,7 +4828,7 @@
             <a:pPr lvl="1"/>
             <a:r>
               <a:rPr lang="en-US" dirty="0"/>
-              <a:t>+  -         	=&gt; Unary plus and unary minus </a:t>
+              <a:t>+  -         		=&gt; Unary plus and unary minus </a:t>
             </a:r>
           </a:p>
           <a:p>
@@ -6263,13 +6190,13 @@
           <a:p>
             <a:r>
               <a:rPr lang="en-US" altLang="en-US" dirty="0"/>
+              <a:t>Variables </a:t>
+            </a:r>
+          </a:p>
+          <a:p>
+            <a:r>
+              <a:rPr lang="en-US" altLang="en-US" dirty="0"/>
               <a:t>Data types</a:t>
-            </a:r>
-          </a:p>
-          <a:p>
-            <a:r>
-              <a:rPr lang="en-US" altLang="en-US" dirty="0"/>
-              <a:t>Variables</a:t>
             </a:r>
           </a:p>
           <a:p>
@@ -6365,12 +6292,6 @@
               <a:buChar char="o"/>
             </a:pPr>
             <a:r>
-              <a:rPr lang="en-US" altLang="en-US" dirty="0">
-                <a:latin typeface="Calibri" panose="020F0502020204030204" pitchFamily="34" charset="0"/>
-              </a:rPr>
-              <a:t>In Java, </a:t>
-            </a:r>
-            <a:r>
               <a:rPr lang="ja-JP" altLang="en-US">
                 <a:latin typeface="Calibri" panose="020F0502020204030204" pitchFamily="34" charset="0"/>
               </a:rPr>
@@ -6380,7 +6301,7 @@
               <a:rPr lang="en-US" altLang="ja-JP" dirty="0">
                 <a:latin typeface="Calibri" panose="020F0502020204030204" pitchFamily="34" charset="0"/>
               </a:rPr>
-              <a:t>print</a:t>
+              <a:t>print()</a:t>
             </a:r>
             <a:r>
               <a:rPr lang="ja-JP" altLang="en-US">
@@ -6392,7 +6313,7 @@
               <a:rPr lang="en-US" altLang="ja-JP" dirty="0">
                 <a:latin typeface="Calibri" panose="020F0502020204030204" pitchFamily="34" charset="0"/>
               </a:rPr>
-              <a:t> really means </a:t>
+              <a:t> function </a:t>
             </a:r>
             <a:r>
               <a:rPr lang="ja-JP" altLang="en-US">
@@ -6415,13 +6336,6 @@
             <a:endParaRPr lang="en-US" altLang="ja-JP" dirty="0">
               <a:latin typeface="Calibri" panose="020F0502020204030204" pitchFamily="34" charset="0"/>
             </a:endParaRPr>
-          </a:p>
-          <a:p>
-            <a:pPr lvl="1"/>
-            <a:r>
-              <a:rPr lang="en-US" altLang="en-US" dirty="0"/>
-              <a:t>Printing on actual paper is much harder!</a:t>
-            </a:r>
           </a:p>
           <a:p>
             <a:pPr>
@@ -6429,6 +6343,72 @@
               <a:buChar char="o"/>
             </a:pPr>
             <a:r>
+              <a:rPr lang="ja-JP" altLang="en-US">
+                <a:latin typeface="Calibri" panose="020F0502020204030204" pitchFamily="34" charset="0"/>
+              </a:rPr>
+              <a:t>“</a:t>
+            </a:r>
+            <a:r>
+              <a:rPr lang="en-US" altLang="ja-JP" dirty="0" err="1">
+                <a:latin typeface="Calibri" panose="020F0502020204030204" pitchFamily="34" charset="0"/>
+              </a:rPr>
+              <a:t>println</a:t>
+            </a:r>
+            <a:r>
+              <a:rPr lang="en-US" altLang="ja-JP" dirty="0">
+                <a:latin typeface="Calibri" panose="020F0502020204030204" pitchFamily="34" charset="0"/>
+              </a:rPr>
+              <a:t>()</a:t>
+            </a:r>
+            <a:r>
+              <a:rPr lang="ja-JP" altLang="en-US">
+                <a:latin typeface="Calibri" panose="020F0502020204030204" pitchFamily="34" charset="0"/>
+              </a:rPr>
+              <a:t>”</a:t>
+            </a:r>
+            <a:r>
+              <a:rPr lang="en-US" altLang="ja-JP" dirty="0">
+                <a:latin typeface="Calibri" panose="020F0502020204030204" pitchFamily="34" charset="0"/>
+              </a:rPr>
+              <a:t> function </a:t>
+            </a:r>
+            <a:r>
+              <a:rPr lang="ja-JP" altLang="en-US">
+                <a:latin typeface="Calibri" panose="020F0502020204030204" pitchFamily="34" charset="0"/>
+              </a:rPr>
+              <a:t>“</a:t>
+            </a:r>
+            <a:r>
+              <a:rPr lang="en-US" altLang="ja-JP" dirty="0">
+                <a:latin typeface="Calibri" panose="020F0502020204030204" pitchFamily="34" charset="0"/>
+              </a:rPr>
+              <a:t>display a line and adds a new line in a window on the screen</a:t>
+            </a:r>
+            <a:r>
+              <a:rPr lang="ja-JP" altLang="en-US">
+                <a:latin typeface="Calibri" panose="020F0502020204030204" pitchFamily="34" charset="0"/>
+              </a:rPr>
+              <a:t>”</a:t>
+            </a:r>
+            <a:endParaRPr lang="en-US" altLang="ja-JP" dirty="0">
+              <a:latin typeface="Calibri" panose="020F0502020204030204" pitchFamily="34" charset="0"/>
+            </a:endParaRPr>
+          </a:p>
+          <a:p>
+            <a:pPr>
+              <a:buFont typeface="Courier New" panose="02070309020205020404" pitchFamily="49" charset="0"/>
+              <a:buChar char="o"/>
+            </a:pPr>
+            <a:endParaRPr lang="en-US" altLang="ja-JP" dirty="0">
+              <a:latin typeface="Calibri" panose="020F0502020204030204" pitchFamily="34" charset="0"/>
+            </a:endParaRPr>
+          </a:p>
+          <a:p>
+            <a:pPr>
+              <a:buFont typeface="Courier New" panose="02070309020205020404" pitchFamily="49" charset="0"/>
+              <a:buChar char="o"/>
+            </a:pPr>
+            <a:r>
               <a:rPr lang="en-US" altLang="en-US" dirty="0">
                 <a:latin typeface="Calibri" panose="020F0502020204030204" pitchFamily="34" charset="0"/>
               </a:rPr>
@@ -6445,6 +6425,21 @@
               <a:rPr lang="en-US" altLang="en-US" dirty="0"/>
               <a:t>(x);</a:t>
             </a:r>
+          </a:p>
+          <a:p>
+            <a:pPr lvl="1"/>
+            <a:r>
+              <a:rPr lang="en-US" altLang="en-US" dirty="0" err="1"/>
+              <a:t>System.out.println</a:t>
+            </a:r>
+            <a:r>
+              <a:rPr lang="en-US" altLang="en-US" dirty="0"/>
+              <a:t>(x);</a:t>
+            </a:r>
+          </a:p>
+          <a:p>
+            <a:pPr lvl="1"/>
+            <a:endParaRPr lang="en-US" altLang="en-US" dirty="0"/>
           </a:p>
           <a:p>
             <a:pPr>
@@ -6453,437 +6448,6 @@
             </a:pPr>
             <a:endParaRPr lang="en-US" altLang="en-US" dirty="0">
               <a:latin typeface="Calibri" panose="020F0502020204030204" pitchFamily="34" charset="0"/>
-            </a:endParaRPr>
-          </a:p>
-        </p:txBody>
-      </p:sp>
-    </p:spTree>
-  </p:cSld>
-  <p:clrMapOvr>
-    <a:masterClrMapping/>
-  </p:clrMapOvr>
-</p:sld>
-</file>
-
-<file path=ppt/slides/slide21.xml><?xml version="1.0" encoding="utf-8"?>
-<p:sld xmlns:a="http://schemas.openxmlformats.org/drawingml/2006/main" xmlns:r="http://schemas.openxmlformats.org/officeDocument/2006/relationships" xmlns:p="http://schemas.openxmlformats.org/presentationml/2006/main" showMasterPhAnim="0">
-  <p:cSld>
-    <p:spTree>
-      <p:nvGrpSpPr>
-        <p:cNvPr id="1" name=""/>
-        <p:cNvGrpSpPr/>
-        <p:nvPr/>
-      </p:nvGrpSpPr>
-      <p:grpSpPr>
-        <a:xfrm>
-          <a:off x="0" y="0"/>
-          <a:ext cx="0" cy="0"/>
-          <a:chOff x="0" y="0"/>
-          <a:chExt cx="0" cy="0"/>
-        </a:xfrm>
-      </p:grpSpPr>
-      <p:sp>
-        <p:nvSpPr>
-          <p:cNvPr id="158722" name="Rectangle 2">
-            <a:extLst>
-              <a:ext uri="{FF2B5EF4-FFF2-40B4-BE49-F238E27FC236}">
-                <a16:creationId xmlns:a16="http://schemas.microsoft.com/office/drawing/2014/main" id="{E16CB106-B912-F6C7-4F6B-A6337D482D0E}"/>
-              </a:ext>
-            </a:extLst>
-          </p:cNvPr>
-          <p:cNvSpPr>
-            <a:spLocks noGrp="1" noRot="1" noChangeArrowheads="1"/>
-          </p:cNvSpPr>
-          <p:nvPr>
-            <p:ph type="title"/>
-          </p:nvPr>
-        </p:nvSpPr>
-        <p:spPr/>
-        <p:txBody>
-          <a:bodyPr vert="horz" lIns="91440" tIns="45720" rIns="91440" bIns="45720" rtlCol="0" anchor="ctr">
-            <a:normAutofit/>
-          </a:bodyPr>
-          <a:lstStyle/>
-          <a:p>
-            <a:r>
-              <a:rPr lang="en-US" altLang="en-US" dirty="0">
-                <a:latin typeface="Calibri" panose="020F0502020204030204" pitchFamily="34" charset="0"/>
-              </a:rPr>
-              <a:t>Printing out results</a:t>
-            </a:r>
-          </a:p>
-        </p:txBody>
-      </p:sp>
-      <p:sp>
-        <p:nvSpPr>
-          <p:cNvPr id="158723" name="Rectangle 3">
-            <a:extLst>
-              <a:ext uri="{FF2B5EF4-FFF2-40B4-BE49-F238E27FC236}">
-                <a16:creationId xmlns:a16="http://schemas.microsoft.com/office/drawing/2014/main" id="{CAA8506B-2692-8A9F-A349-2D7D28A057D2}"/>
-              </a:ext>
-            </a:extLst>
-          </p:cNvPr>
-          <p:cNvSpPr>
-            <a:spLocks noGrp="1" noChangeArrowheads="1"/>
-          </p:cNvSpPr>
-          <p:nvPr>
-            <p:ph idx="1"/>
-          </p:nvPr>
-        </p:nvSpPr>
-        <p:spPr/>
-        <p:txBody>
-          <a:bodyPr vert="horz" lIns="45720" tIns="45720" rIns="45720" bIns="45720" rtlCol="0">
-            <a:normAutofit/>
-          </a:bodyPr>
-          <a:lstStyle/>
-          <a:p>
-            <a:pPr>
-              <a:buFont typeface="Courier New" panose="02070309020205020404" pitchFamily="49" charset="0"/>
-              <a:buChar char="o"/>
-            </a:pPr>
-            <a:r>
-              <a:rPr lang="en-US" altLang="en-US" dirty="0">
-                <a:latin typeface="Calibri" panose="020F0502020204030204" pitchFamily="34" charset="0"/>
-              </a:rPr>
-              <a:t>Examples:</a:t>
-            </a:r>
-          </a:p>
-          <a:p>
-            <a:pPr lvl="1"/>
-            <a:r>
-              <a:rPr lang="en-US" altLang="en-US" dirty="0" err="1"/>
-              <a:t>System.out.print</a:t>
-            </a:r>
-            <a:r>
-              <a:rPr lang="en-US" altLang="en-US" dirty="0"/>
-              <a:t>("The sum of x and y is ");</a:t>
-            </a:r>
-          </a:p>
-          <a:p>
-            <a:pPr lvl="1"/>
-            <a:r>
-              <a:rPr lang="en-US" altLang="en-US" dirty="0" err="1"/>
-              <a:t>System.out.println</a:t>
-            </a:r>
-            <a:r>
-              <a:rPr lang="en-US" altLang="en-US" dirty="0"/>
-              <a:t>(x + y);</a:t>
-            </a:r>
-          </a:p>
-          <a:p>
-            <a:pPr>
-              <a:buFont typeface="Courier New" panose="02070309020205020404" pitchFamily="49" charset="0"/>
-              <a:buChar char="o"/>
-            </a:pPr>
-            <a:r>
-              <a:rPr lang="en-US" altLang="en-US" dirty="0">
-                <a:latin typeface="Calibri" panose="020F0502020204030204" pitchFamily="34" charset="0"/>
-              </a:rPr>
-              <a:t>If you print from an IDE , an output window(console) opens automatically</a:t>
-            </a:r>
-          </a:p>
-        </p:txBody>
-      </p:sp>
-    </p:spTree>
-  </p:cSld>
-  <p:clrMapOvr>
-    <a:masterClrMapping/>
-  </p:clrMapOvr>
-</p:sld>
-</file>
-
-<file path=ppt/slides/slide22.xml><?xml version="1.0" encoding="utf-8"?>
-<p:sld xmlns:a="http://schemas.openxmlformats.org/drawingml/2006/main" xmlns:r="http://schemas.openxmlformats.org/officeDocument/2006/relationships" xmlns:p="http://schemas.openxmlformats.org/presentationml/2006/main" showMasterPhAnim="0">
-  <p:cSld>
-    <p:spTree>
-      <p:nvGrpSpPr>
-        <p:cNvPr id="1" name=""/>
-        <p:cNvGrpSpPr/>
-        <p:nvPr/>
-      </p:nvGrpSpPr>
-      <p:grpSpPr>
-        <a:xfrm>
-          <a:off x="0" y="0"/>
-          <a:ext cx="0" cy="0"/>
-          <a:chOff x="0" y="0"/>
-          <a:chExt cx="0" cy="0"/>
-        </a:xfrm>
-      </p:grpSpPr>
-      <p:sp>
-        <p:nvSpPr>
-          <p:cNvPr id="163842" name="Rectangle 2">
-            <a:extLst>
-              <a:ext uri="{FF2B5EF4-FFF2-40B4-BE49-F238E27FC236}">
-                <a16:creationId xmlns:a16="http://schemas.microsoft.com/office/drawing/2014/main" id="{669A37EE-7901-E034-2E95-9EB163FDA693}"/>
-              </a:ext>
-            </a:extLst>
-          </p:cNvPr>
-          <p:cNvSpPr>
-            <a:spLocks noGrp="1" noRot="1" noChangeArrowheads="1"/>
-          </p:cNvSpPr>
-          <p:nvPr>
-            <p:ph type="title"/>
-          </p:nvPr>
-        </p:nvSpPr>
-        <p:spPr/>
-        <p:txBody>
-          <a:bodyPr vert="horz" lIns="91440" tIns="45720" rIns="91440" bIns="45720" rtlCol="0" anchor="ctr">
-            <a:normAutofit/>
-          </a:bodyPr>
-          <a:lstStyle/>
-          <a:p>
-            <a:r>
-              <a:rPr lang="en-US" altLang="en-US" dirty="0">
-                <a:latin typeface="Calibri" panose="020F0502020204030204" pitchFamily="34" charset="0"/>
-              </a:rPr>
-              <a:t>A Java program</a:t>
-            </a:r>
-          </a:p>
-        </p:txBody>
-      </p:sp>
-      <p:sp>
-        <p:nvSpPr>
-          <p:cNvPr id="163843" name="Rectangle 3">
-            <a:extLst>
-              <a:ext uri="{FF2B5EF4-FFF2-40B4-BE49-F238E27FC236}">
-                <a16:creationId xmlns:a16="http://schemas.microsoft.com/office/drawing/2014/main" id="{0920187F-1E43-27D0-34BF-C83117721186}"/>
-              </a:ext>
-            </a:extLst>
-          </p:cNvPr>
-          <p:cNvSpPr>
-            <a:spLocks noGrp="1" noChangeArrowheads="1"/>
-          </p:cNvSpPr>
-          <p:nvPr>
-            <p:ph idx="1"/>
-          </p:nvPr>
-        </p:nvSpPr>
-        <p:spPr/>
-        <p:txBody>
-          <a:bodyPr/>
-          <a:lstStyle/>
-          <a:p>
-            <a:pPr>
-              <a:spcBef>
-                <a:spcPct val="50000"/>
-              </a:spcBef>
-              <a:buClrTx/>
-              <a:buSzTx/>
-              <a:buFontTx/>
-              <a:buNone/>
-              <a:defRPr/>
-            </a:pPr>
-            <a:r>
-              <a:rPr lang="en-US" dirty="0">
-                <a:solidFill>
-                  <a:schemeClr val="accent2"/>
-                </a:solidFill>
-                <a:effectLst/>
-                <a:latin typeface="Calibri" panose="020F0502020204030204" pitchFamily="34" charset="0"/>
-                <a:cs typeface="Calibri" panose="020F0502020204030204" pitchFamily="34" charset="0"/>
-              </a:rPr>
-              <a:t>public class </a:t>
-            </a:r>
-            <a:r>
-              <a:rPr lang="en-US" dirty="0" err="1">
-                <a:solidFill>
-                  <a:schemeClr val="accent2"/>
-                </a:solidFill>
-                <a:effectLst/>
-                <a:latin typeface="Calibri" panose="020F0502020204030204" pitchFamily="34" charset="0"/>
-                <a:cs typeface="Calibri" panose="020F0502020204030204" pitchFamily="34" charset="0"/>
-              </a:rPr>
-              <a:t>TwoPlusTwo</a:t>
-            </a:r>
-            <a:r>
-              <a:rPr lang="en-US" dirty="0">
-                <a:solidFill>
-                  <a:schemeClr val="accent2"/>
-                </a:solidFill>
-                <a:effectLst/>
-                <a:latin typeface="Calibri" panose="020F0502020204030204" pitchFamily="34" charset="0"/>
-                <a:cs typeface="Calibri" panose="020F0502020204030204" pitchFamily="34" charset="0"/>
-              </a:rPr>
-              <a:t> {</a:t>
-            </a:r>
-            <a:br>
-              <a:rPr lang="en-US" dirty="0">
-                <a:solidFill>
-                  <a:schemeClr val="accent2"/>
-                </a:solidFill>
-                <a:effectLst/>
-                <a:latin typeface="Calibri" panose="020F0502020204030204" pitchFamily="34" charset="0"/>
-                <a:cs typeface="Calibri" panose="020F0502020204030204" pitchFamily="34" charset="0"/>
-              </a:rPr>
-            </a:br>
-            <a:r>
-              <a:rPr lang="en-US" dirty="0">
-                <a:solidFill>
-                  <a:schemeClr val="accent2"/>
-                </a:solidFill>
-                <a:effectLst/>
-                <a:latin typeface="Calibri" panose="020F0502020204030204" pitchFamily="34" charset="0"/>
-                <a:cs typeface="Calibri" panose="020F0502020204030204" pitchFamily="34" charset="0"/>
-              </a:rPr>
-              <a:t>    public static void main(String </a:t>
-            </a:r>
-            <a:r>
-              <a:rPr lang="en-US" dirty="0" err="1">
-                <a:solidFill>
-                  <a:schemeClr val="accent2"/>
-                </a:solidFill>
-                <a:effectLst/>
-                <a:latin typeface="Calibri" panose="020F0502020204030204" pitchFamily="34" charset="0"/>
-                <a:cs typeface="Calibri" panose="020F0502020204030204" pitchFamily="34" charset="0"/>
-              </a:rPr>
-              <a:t>args</a:t>
-            </a:r>
-            <a:r>
-              <a:rPr lang="en-US" dirty="0">
-                <a:solidFill>
-                  <a:schemeClr val="accent2"/>
-                </a:solidFill>
-                <a:effectLst/>
-                <a:latin typeface="Calibri" panose="020F0502020204030204" pitchFamily="34" charset="0"/>
-                <a:cs typeface="Calibri" panose="020F0502020204030204" pitchFamily="34" charset="0"/>
-              </a:rPr>
-              <a:t>[]) {</a:t>
-            </a:r>
-            <a:br>
-              <a:rPr lang="en-US" dirty="0">
-                <a:solidFill>
-                  <a:schemeClr val="accent2"/>
-                </a:solidFill>
-                <a:effectLst/>
-                <a:latin typeface="Calibri" panose="020F0502020204030204" pitchFamily="34" charset="0"/>
-                <a:cs typeface="Calibri" panose="020F0502020204030204" pitchFamily="34" charset="0"/>
-              </a:rPr>
-            </a:br>
-            <a:r>
-              <a:rPr lang="en-US" dirty="0">
-                <a:solidFill>
-                  <a:schemeClr val="accent2"/>
-                </a:solidFill>
-                <a:effectLst/>
-                <a:latin typeface="Calibri" panose="020F0502020204030204" pitchFamily="34" charset="0"/>
-                <a:cs typeface="Calibri" panose="020F0502020204030204" pitchFamily="34" charset="0"/>
-              </a:rPr>
-              <a:t>        </a:t>
-            </a:r>
-            <a:r>
-              <a:rPr lang="en-US" dirty="0" err="1">
-                <a:solidFill>
-                  <a:schemeClr val="accent2"/>
-                </a:solidFill>
-                <a:effectLst/>
-                <a:latin typeface="Calibri" panose="020F0502020204030204" pitchFamily="34" charset="0"/>
-                <a:cs typeface="Calibri" panose="020F0502020204030204" pitchFamily="34" charset="0"/>
-              </a:rPr>
-              <a:t>System.out.println</a:t>
-            </a:r>
-            <a:r>
-              <a:rPr lang="en-US" dirty="0">
-                <a:solidFill>
-                  <a:schemeClr val="accent2"/>
-                </a:solidFill>
-                <a:effectLst/>
-                <a:latin typeface="Calibri" panose="020F0502020204030204" pitchFamily="34" charset="0"/>
-                <a:cs typeface="Calibri" panose="020F0502020204030204" pitchFamily="34" charset="0"/>
-              </a:rPr>
-              <a:t>(2 + 2);</a:t>
-            </a:r>
-            <a:br>
-              <a:rPr lang="en-US" dirty="0">
-                <a:solidFill>
-                  <a:schemeClr val="accent2"/>
-                </a:solidFill>
-                <a:effectLst/>
-                <a:latin typeface="Calibri" panose="020F0502020204030204" pitchFamily="34" charset="0"/>
-                <a:cs typeface="Calibri" panose="020F0502020204030204" pitchFamily="34" charset="0"/>
-              </a:rPr>
-            </a:br>
-            <a:r>
-              <a:rPr lang="en-US" dirty="0">
-                <a:solidFill>
-                  <a:schemeClr val="accent2"/>
-                </a:solidFill>
-                <a:effectLst/>
-                <a:latin typeface="Calibri" panose="020F0502020204030204" pitchFamily="34" charset="0"/>
-                <a:cs typeface="Calibri" panose="020F0502020204030204" pitchFamily="34" charset="0"/>
-              </a:rPr>
-              <a:t>    }</a:t>
-            </a:r>
-            <a:br>
-              <a:rPr lang="en-US" dirty="0">
-                <a:solidFill>
-                  <a:schemeClr val="accent2"/>
-                </a:solidFill>
-                <a:effectLst/>
-                <a:latin typeface="Calibri" panose="020F0502020204030204" pitchFamily="34" charset="0"/>
-                <a:cs typeface="Calibri" panose="020F0502020204030204" pitchFamily="34" charset="0"/>
-              </a:rPr>
-            </a:br>
-            <a:r>
-              <a:rPr lang="en-US" dirty="0">
-                <a:solidFill>
-                  <a:schemeClr val="accent2"/>
-                </a:solidFill>
-                <a:effectLst/>
-                <a:latin typeface="Calibri" panose="020F0502020204030204" pitchFamily="34" charset="0"/>
-                <a:cs typeface="Calibri" panose="020F0502020204030204" pitchFamily="34" charset="0"/>
-              </a:rPr>
-              <a:t>}</a:t>
-            </a:r>
-          </a:p>
-          <a:p>
-            <a:pPr>
-              <a:spcBef>
-                <a:spcPct val="50000"/>
-              </a:spcBef>
-              <a:buClrTx/>
-              <a:buSzTx/>
-              <a:buFontTx/>
-              <a:buNone/>
-              <a:defRPr/>
-            </a:pPr>
-            <a:endParaRPr lang="en-US" dirty="0">
-              <a:solidFill>
-                <a:schemeClr val="accent2"/>
-              </a:solidFill>
-              <a:latin typeface="Calibri" panose="020F0502020204030204" pitchFamily="34" charset="0"/>
-              <a:cs typeface="Calibri" panose="020F0502020204030204" pitchFamily="34" charset="0"/>
-            </a:endParaRPr>
-          </a:p>
-          <a:p>
-            <a:pPr>
-              <a:spcBef>
-                <a:spcPct val="50000"/>
-              </a:spcBef>
-              <a:buClrTx/>
-              <a:buSzTx/>
-              <a:buFontTx/>
-              <a:buNone/>
-              <a:defRPr/>
-            </a:pPr>
-            <a:r>
-              <a:rPr lang="en-US" dirty="0">
-                <a:effectLst/>
-                <a:latin typeface="Calibri" panose="020F0502020204030204" pitchFamily="34" charset="0"/>
-                <a:cs typeface="Calibri" panose="020F0502020204030204" pitchFamily="34" charset="0"/>
-              </a:rPr>
-              <a:t>*Please note, save this file as </a:t>
-            </a:r>
-            <a:r>
-              <a:rPr lang="en-US" dirty="0" err="1">
-                <a:effectLst/>
-                <a:latin typeface="Calibri" panose="020F0502020204030204" pitchFamily="34" charset="0"/>
-                <a:cs typeface="Calibri" panose="020F0502020204030204" pitchFamily="34" charset="0"/>
-              </a:rPr>
-              <a:t>TwoPlusTwo.java</a:t>
-            </a:r>
-            <a:endParaRPr lang="en-US" dirty="0">
-              <a:effectLst/>
-              <a:latin typeface="Calibri" panose="020F0502020204030204" pitchFamily="34" charset="0"/>
-              <a:cs typeface="Calibri" panose="020F0502020204030204" pitchFamily="34" charset="0"/>
             </a:endParaRPr>
           </a:p>
         </p:txBody>
@@ -6915,10 +6479,10 @@
       </p:grpSpPr>
       <p:sp>
         <p:nvSpPr>
-          <p:cNvPr id="166914" name="Rectangle 2">
-            <a:extLst>
-              <a:ext uri="{FF2B5EF4-FFF2-40B4-BE49-F238E27FC236}">
-                <a16:creationId xmlns:a16="http://schemas.microsoft.com/office/drawing/2014/main" id="{1B0483B0-613F-BF09-143B-4D4D4D8022D3}"/>
+          <p:cNvPr id="148482" name="Rectangle 2">
+            <a:extLst>
+              <a:ext uri="{FF2B5EF4-FFF2-40B4-BE49-F238E27FC236}">
+                <a16:creationId xmlns:a16="http://schemas.microsoft.com/office/drawing/2014/main" id="{F831B61D-58C3-B218-4023-E2ACC5861AFB}"/>
               </a:ext>
             </a:extLst>
           </p:cNvPr>
@@ -6936,25 +6500,21 @@
           <a:p>
             <a:pPr eaLnBrk="1" hangingPunct="1"/>
             <a:r>
-              <a:rPr lang="en-US" altLang="en-US" dirty="0"/>
-              <a:t>Data </a:t>
-            </a:r>
-            <a:r>
               <a:rPr lang="en-US" altLang="en-US" dirty="0">
                 <a:latin typeface="Calibri" panose="020F0502020204030204" pitchFamily="34" charset="0"/>
-                <a:cs typeface="Calibri" panose="020F0502020204030204" pitchFamily="34" charset="0"/>
-              </a:rPr>
-              <a:t>Types</a:t>
-            </a:r>
-          </a:p>
-        </p:txBody>
-      </p:sp>
-      <p:sp>
-        <p:nvSpPr>
-          <p:cNvPr id="166915" name="Rectangle 3">
-            <a:extLst>
-              <a:ext uri="{FF2B5EF4-FFF2-40B4-BE49-F238E27FC236}">
-                <a16:creationId xmlns:a16="http://schemas.microsoft.com/office/drawing/2014/main" id="{AC160CDA-A118-6F83-CAA3-E0D483913E7A}"/>
+              </a:rPr>
+              <a:t>Variables</a:t>
+            </a:r>
+            <a:endParaRPr lang="en-US" altLang="en-US" dirty="0"/>
+          </a:p>
+        </p:txBody>
+      </p:sp>
+      <p:sp>
+        <p:nvSpPr>
+          <p:cNvPr id="148483" name="Rectangle 3">
+            <a:extLst>
+              <a:ext uri="{FF2B5EF4-FFF2-40B4-BE49-F238E27FC236}">
+                <a16:creationId xmlns:a16="http://schemas.microsoft.com/office/drawing/2014/main" id="{56EC4E77-B869-C753-93BB-9C42137187A0}"/>
               </a:ext>
             </a:extLst>
           </p:cNvPr>
@@ -6965,10 +6525,15 @@
             <p:ph idx="1"/>
           </p:nvPr>
         </p:nvSpPr>
-        <p:spPr/>
+        <p:spPr>
+          <a:xfrm>
+            <a:off x="1981201" y="2084832"/>
+            <a:ext cx="7600951" cy="4224528"/>
+          </a:xfrm>
+        </p:spPr>
         <p:txBody>
           <a:bodyPr vert="horz" lIns="45720" tIns="45720" rIns="45720" bIns="45720" rtlCol="0">
-            <a:normAutofit/>
+            <a:normAutofit fontScale="92500" lnSpcReduction="20000"/>
           </a:bodyPr>
           <a:lstStyle/>
           <a:p>
@@ -6977,39 +6542,10 @@
               <a:buChar char="o"/>
             </a:pPr>
             <a:r>
-              <a:rPr lang="en-US" altLang="en-US" dirty="0">
-                <a:latin typeface="Calibri" panose="020F0502020204030204" pitchFamily="34" charset="0"/>
-                <a:cs typeface="Calibri" panose="020F0502020204030204" pitchFamily="34" charset="0"/>
-              </a:rPr>
-              <a:t>Primitives are the </a:t>
-            </a:r>
-            <a:r>
-              <a:rPr lang="ja-JP" altLang="en-US">
-                <a:latin typeface="Calibri" panose="020F0502020204030204" pitchFamily="34" charset="0"/>
-                <a:cs typeface="Calibri" panose="020F0502020204030204" pitchFamily="34" charset="0"/>
-              </a:rPr>
-              <a:t>“</a:t>
-            </a:r>
-            <a:r>
-              <a:rPr lang="en-US" altLang="ja-JP" dirty="0">
-                <a:latin typeface="Calibri" panose="020F0502020204030204" pitchFamily="34" charset="0"/>
-                <a:cs typeface="Calibri" panose="020F0502020204030204" pitchFamily="34" charset="0"/>
-              </a:rPr>
-              <a:t>basic</a:t>
-            </a:r>
-            <a:r>
-              <a:rPr lang="ja-JP" altLang="en-US">
-                <a:latin typeface="Calibri" panose="020F0502020204030204" pitchFamily="34" charset="0"/>
-                <a:cs typeface="Calibri" panose="020F0502020204030204" pitchFamily="34" charset="0"/>
-              </a:rPr>
-              <a:t>”</a:t>
-            </a:r>
-            <a:r>
-              <a:rPr lang="en-US" altLang="ja-JP" dirty="0">
-                <a:latin typeface="Calibri" panose="020F0502020204030204" pitchFamily="34" charset="0"/>
-                <a:cs typeface="Calibri" panose="020F0502020204030204" pitchFamily="34" charset="0"/>
-              </a:rPr>
-              <a:t> data values</a:t>
+              <a:rPr lang="en-US" dirty="0">
+                <a:latin typeface="Calibri" panose="020F0502020204030204" pitchFamily="34" charset="0"/>
+              </a:rPr>
+              <a:t>Variable in Java is a data container that saves the data values during Java program execution.</a:t>
             </a:r>
           </a:p>
           <a:p>
@@ -7020,26 +6556,101 @@
             <a:r>
               <a:rPr lang="en-US" altLang="en-US" dirty="0">
                 <a:latin typeface="Calibri" panose="020F0502020204030204" pitchFamily="34" charset="0"/>
+              </a:rPr>
+              <a:t>Before you use a variable, you must also define it (tell Java what value it has)</a:t>
+            </a:r>
+          </a:p>
+          <a:p>
+            <a:pPr>
+              <a:buFont typeface="Courier New" panose="02070309020205020404" pitchFamily="49" charset="0"/>
+              <a:buChar char="o"/>
+            </a:pPr>
+            <a:r>
+              <a:rPr lang="en-US" dirty="0">
+                <a:latin typeface="Calibri" panose="020F0502020204030204" pitchFamily="34" charset="0"/>
+              </a:rPr>
+              <a:t>The variable name is combined with two words, the second word will start with an uppercase letter always</a:t>
+            </a:r>
+          </a:p>
+          <a:p>
+            <a:pPr>
+              <a:buFont typeface="Courier New" panose="02070309020205020404" pitchFamily="49" charset="0"/>
+              <a:buChar char="o"/>
+            </a:pPr>
+            <a:r>
+              <a:rPr lang="en-US" altLang="en-US" dirty="0">
+                <a:latin typeface="Calibri" panose="020F0502020204030204" pitchFamily="34" charset="0"/>
+              </a:rPr>
+              <a:t>The value of a variable may change</a:t>
+            </a:r>
+            <a:endParaRPr lang="en-US" dirty="0">
+              <a:latin typeface="Calibri" panose="020F0502020204030204" pitchFamily="34" charset="0"/>
+            </a:endParaRPr>
+          </a:p>
+          <a:p>
+            <a:pPr>
+              <a:buFont typeface="Courier New" panose="02070309020205020404" pitchFamily="49" charset="0"/>
+              <a:buChar char="o"/>
+            </a:pPr>
+            <a:r>
+              <a:rPr lang="en-US" dirty="0" err="1">
+                <a:latin typeface="Calibri" panose="020F0502020204030204" pitchFamily="34" charset="0"/>
+              </a:rPr>
+              <a:t>E.g</a:t>
+            </a:r>
+            <a:r>
+              <a:rPr lang="en-US" dirty="0">
+                <a:latin typeface="Calibri" panose="020F0502020204030204" pitchFamily="34" charset="0"/>
+              </a:rPr>
+              <a:t>:</a:t>
+            </a:r>
+          </a:p>
+          <a:p>
+            <a:pPr lvl="1"/>
+            <a:r>
+              <a:rPr lang="en-US" altLang="en-US" dirty="0">
+                <a:latin typeface="Calibri" panose="020F0502020204030204" pitchFamily="34" charset="0"/>
                 <a:cs typeface="Calibri" panose="020F0502020204030204" pitchFamily="34" charset="0"/>
               </a:rPr>
-              <a:t>There are eight types of primitives:</a:t>
+              <a:t>int </a:t>
+            </a:r>
+            <a:r>
+              <a:rPr lang="en-US" altLang="en-US" dirty="0" err="1">
+                <a:latin typeface="Calibri" panose="020F0502020204030204" pitchFamily="34" charset="0"/>
+                <a:cs typeface="Calibri" panose="020F0502020204030204" pitchFamily="34" charset="0"/>
+              </a:rPr>
+              <a:t>classSize</a:t>
+            </a:r>
+            <a:r>
+              <a:rPr lang="en-US" altLang="en-US" dirty="0">
+                <a:latin typeface="Calibri" panose="020F0502020204030204" pitchFamily="34" charset="0"/>
+                <a:cs typeface="Calibri" panose="020F0502020204030204" pitchFamily="34" charset="0"/>
+              </a:rPr>
+              <a:t> = 10;</a:t>
             </a:r>
           </a:p>
           <a:p>
             <a:pPr lvl="1"/>
             <a:r>
+              <a:rPr lang="en-US" altLang="en-US" dirty="0">
+                <a:latin typeface="Calibri" panose="020F0502020204030204" pitchFamily="34" charset="0"/>
+                <a:cs typeface="Calibri" panose="020F0502020204030204" pitchFamily="34" charset="0"/>
+              </a:rPr>
+              <a:t>double </a:t>
+            </a:r>
+            <a:r>
               <a:rPr lang="en-US" altLang="en-US" dirty="0" err="1">
                 <a:latin typeface="Calibri" panose="020F0502020204030204" pitchFamily="34" charset="0"/>
                 <a:cs typeface="Calibri" panose="020F0502020204030204" pitchFamily="34" charset="0"/>
               </a:rPr>
-              <a:t>boolean</a:t>
+              <a:t>myBankBalance</a:t>
             </a:r>
             <a:r>
               <a:rPr lang="en-US" altLang="en-US" dirty="0">
                 <a:latin typeface="Calibri" panose="020F0502020204030204" pitchFamily="34" charset="0"/>
                 <a:cs typeface="Calibri" panose="020F0502020204030204" pitchFamily="34" charset="0"/>
               </a:rPr>
-              <a:t> -- used for true and false values</a:t>
+              <a:t> = 2000.37;</a:t>
             </a:r>
           </a:p>
           <a:p>
@@ -7049,7 +6660,21 @@
                 <a:latin typeface="Calibri" panose="020F0502020204030204" pitchFamily="34" charset="0"/>
                 <a:cs typeface="Calibri" panose="020F0502020204030204" pitchFamily="34" charset="0"/>
               </a:rPr>
-              <a:t>char -- used for single characters (letters, etc.)</a:t>
+              <a:t>int </a:t>
+            </a:r>
+            <a:r>
+              <a:rPr lang="en-US" altLang="en-US" dirty="0" err="1">
+                <a:latin typeface="Calibri" panose="020F0502020204030204" pitchFamily="34" charset="0"/>
+                <a:cs typeface="Calibri" panose="020F0502020204030204" pitchFamily="34" charset="0"/>
+              </a:rPr>
+              <a:t>myAge</a:t>
+            </a:r>
+            <a:r>
+              <a:rPr lang="en-US" altLang="en-US" dirty="0">
+                <a:latin typeface="Calibri" panose="020F0502020204030204" pitchFamily="34" charset="0"/>
+                <a:cs typeface="Calibri" panose="020F0502020204030204" pitchFamily="34" charset="0"/>
+              </a:rPr>
+              <a:t> = 30;</a:t>
             </a:r>
           </a:p>
           <a:p>
@@ -7059,17 +6684,231 @@
                 <a:latin typeface="Calibri" panose="020F0502020204030204" pitchFamily="34" charset="0"/>
                 <a:cs typeface="Calibri" panose="020F0502020204030204" pitchFamily="34" charset="0"/>
               </a:rPr>
-              <a:t>byte, short, int, long -- four different kinds of integer (whole number) values</a:t>
-            </a:r>
-          </a:p>
-          <a:p>
-            <a:pPr lvl="1"/>
+              <a:t>float </a:t>
+            </a:r>
+            <a:r>
+              <a:rPr lang="en-US" altLang="en-US" dirty="0" err="1">
+                <a:latin typeface="Calibri" panose="020F0502020204030204" pitchFamily="34" charset="0"/>
+                <a:cs typeface="Calibri" panose="020F0502020204030204" pitchFamily="34" charset="0"/>
+              </a:rPr>
+              <a:t>speedometerReading</a:t>
+            </a:r>
             <a:r>
               <a:rPr lang="en-US" altLang="en-US" dirty="0">
                 <a:latin typeface="Calibri" panose="020F0502020204030204" pitchFamily="34" charset="0"/>
                 <a:cs typeface="Calibri" panose="020F0502020204030204" pitchFamily="34" charset="0"/>
               </a:rPr>
-              <a:t>float, double -- two different kinds of decimal numbers (numbers with a decimal point)</a:t>
+              <a:t> = 23456.4f;</a:t>
+            </a:r>
+          </a:p>
+          <a:p>
+            <a:pPr>
+              <a:buFont typeface="Courier New" panose="02070309020205020404" pitchFamily="49" charset="0"/>
+              <a:buChar char="o"/>
+            </a:pPr>
+            <a:endParaRPr lang="en-US" altLang="en-US" dirty="0">
+              <a:latin typeface="Calibri" panose="020F0502020204030204" pitchFamily="34" charset="0"/>
+            </a:endParaRPr>
+          </a:p>
+        </p:txBody>
+      </p:sp>
+      <p:sp>
+        <p:nvSpPr>
+          <p:cNvPr id="2" name="Line 37">
+            <a:extLst>
+              <a:ext uri="{FF2B5EF4-FFF2-40B4-BE49-F238E27FC236}">
+                <a16:creationId xmlns:a16="http://schemas.microsoft.com/office/drawing/2014/main" id="{0F0E34E7-AB64-1C21-267C-B70EEEFA2B40}"/>
+              </a:ext>
+            </a:extLst>
+          </p:cNvPr>
+          <p:cNvSpPr>
+            <a:spLocks noChangeShapeType="1"/>
+          </p:cNvSpPr>
+          <p:nvPr/>
+        </p:nvSpPr>
+        <p:spPr bwMode="auto">
+          <a:xfrm flipH="1">
+            <a:off x="9062255" y="1134318"/>
+            <a:ext cx="865930" cy="152882"/>
+          </a:xfrm>
+          <a:prstGeom prst="line">
+            <a:avLst/>
+          </a:prstGeom>
+          <a:noFill/>
+          <a:ln w="9525">
+            <a:solidFill>
+              <a:schemeClr val="tx1"/>
+            </a:solidFill>
+            <a:round/>
+            <a:headEnd type="triangle" w="lg" len="lg"/>
+            <a:tailEnd/>
+          </a:ln>
+          <a:effectLst/>
+          <a:extLst>
+            <a:ext uri="{909E8E84-426E-40DD-AFC4-6F175D3DCCD1}">
+              <a14:hiddenFill xmlns:a14="http://schemas.microsoft.com/office/drawing/2010/main">
+                <a:noFill/>
+              </a14:hiddenFill>
+            </a:ext>
+            <a:ext uri="{AF507438-7753-43E0-B8FC-AC1667EBCBE1}">
+              <a14:hiddenEffects xmlns:a14="http://schemas.microsoft.com/office/drawing/2010/main">
+                <a:effectLst>
+                  <a:outerShdw dist="35921" dir="2700000" algn="ctr" rotWithShape="0">
+                    <a:schemeClr val="bg2"/>
+                  </a:outerShdw>
+                </a:effectLst>
+              </a14:hiddenEffects>
+            </a:ext>
+          </a:extLst>
+        </p:spPr>
+        <p:txBody>
+          <a:bodyPr wrap="none" anchor="ctr"/>
+          <a:lstStyle/>
+          <a:p>
+            <a:endParaRPr lang="en-US"/>
+          </a:p>
+        </p:txBody>
+      </p:sp>
+      <p:sp>
+        <p:nvSpPr>
+          <p:cNvPr id="3" name="AutoShape 44">
+            <a:extLst>
+              <a:ext uri="{FF2B5EF4-FFF2-40B4-BE49-F238E27FC236}">
+                <a16:creationId xmlns:a16="http://schemas.microsoft.com/office/drawing/2014/main" id="{299ADF7C-4AFB-4C78-14D2-D37874DAC72B}"/>
+              </a:ext>
+            </a:extLst>
+          </p:cNvPr>
+          <p:cNvSpPr>
+            <a:spLocks noChangeArrowheads="1"/>
+          </p:cNvSpPr>
+          <p:nvPr/>
+        </p:nvSpPr>
+        <p:spPr bwMode="auto">
+          <a:xfrm>
+            <a:off x="9928186" y="757176"/>
+            <a:ext cx="1676400" cy="838200"/>
+          </a:xfrm>
+          <a:prstGeom prst="flowChartProcess">
+            <a:avLst/>
+          </a:prstGeom>
+          <a:noFill/>
+          <a:ln w="9525">
+            <a:solidFill>
+              <a:schemeClr val="tx1"/>
+            </a:solidFill>
+            <a:miter lim="800000"/>
+            <a:headEnd/>
+            <a:tailEnd/>
+          </a:ln>
+          <a:effectLst/>
+          <a:extLst>
+            <a:ext uri="{909E8E84-426E-40DD-AFC4-6F175D3DCCD1}">
+              <a14:hiddenFill xmlns:a14="http://schemas.microsoft.com/office/drawing/2010/main">
+                <a:solidFill>
+                  <a:schemeClr val="accent1"/>
+                </a:solidFill>
+              </a14:hiddenFill>
+            </a:ext>
+            <a:ext uri="{AF507438-7753-43E0-B8FC-AC1667EBCBE1}">
+              <a14:hiddenEffects xmlns:a14="http://schemas.microsoft.com/office/drawing/2010/main">
+                <a:effectLst>
+                  <a:outerShdw dist="35921" dir="2700000" algn="ctr" rotWithShape="0">
+                    <a:schemeClr val="bg2"/>
+                  </a:outerShdw>
+                </a:effectLst>
+              </a14:hiddenEffects>
+            </a:ext>
+          </a:extLst>
+        </p:spPr>
+        <p:txBody>
+          <a:bodyPr wrap="none" anchor="ctr"/>
+          <a:lstStyle/>
+          <a:p>
+            <a:pPr algn="ctr"/>
+            <a:r>
+              <a:rPr lang="en-US" altLang="en-US" sz="2400" i="1" dirty="0">
+                <a:latin typeface="Times New Roman" panose="02020603050405020304" pitchFamily="18" charset="0"/>
+              </a:rPr>
+              <a:t>data</a:t>
+            </a:r>
+            <a:endParaRPr lang="en-US" altLang="en-US" sz="2400" dirty="0">
+              <a:latin typeface="Times New Roman" panose="02020603050405020304" pitchFamily="18" charset="0"/>
+            </a:endParaRPr>
+          </a:p>
+        </p:txBody>
+      </p:sp>
+      <p:sp>
+        <p:nvSpPr>
+          <p:cNvPr id="4" name="Text Box 46">
+            <a:extLst>
+              <a:ext uri="{FF2B5EF4-FFF2-40B4-BE49-F238E27FC236}">
+                <a16:creationId xmlns:a16="http://schemas.microsoft.com/office/drawing/2014/main" id="{FF63D4FB-6C81-8022-2440-DD6B2D739E8D}"/>
+              </a:ext>
+            </a:extLst>
+          </p:cNvPr>
+          <p:cNvSpPr txBox="1">
+            <a:spLocks noChangeArrowheads="1"/>
+          </p:cNvSpPr>
+          <p:nvPr/>
+        </p:nvSpPr>
+        <p:spPr bwMode="auto">
+          <a:xfrm>
+            <a:off x="7774211" y="1056367"/>
+            <a:ext cx="1450091" cy="461665"/>
+          </a:xfrm>
+          <a:prstGeom prst="rect">
+            <a:avLst/>
+          </a:prstGeom>
+          <a:noFill/>
+          <a:ln>
+            <a:noFill/>
+          </a:ln>
+          <a:effectLst/>
+          <a:extLst>
+            <a:ext uri="{909E8E84-426E-40DD-AFC4-6F175D3DCCD1}">
+              <a14:hiddenFill xmlns:a14="http://schemas.microsoft.com/office/drawing/2010/main">
+                <a:solidFill>
+                  <a:schemeClr val="accent1"/>
+                </a:solidFill>
+              </a14:hiddenFill>
+            </a:ext>
+            <a:ext uri="{91240B29-F687-4F45-9708-019B960494DF}">
+              <a14:hiddenLine xmlns:a14="http://schemas.microsoft.com/office/drawing/2010/main" w="9525">
+                <a:solidFill>
+                  <a:schemeClr val="tx1"/>
+                </a:solidFill>
+                <a:miter lim="800000"/>
+                <a:headEnd type="none" w="lg" len="lg"/>
+                <a:tailEnd type="none" w="lg" len="lg"/>
+              </a14:hiddenLine>
+            </a:ext>
+            <a:ext uri="{AF507438-7753-43E0-B8FC-AC1667EBCBE1}">
+              <a14:hiddenEffects xmlns:a14="http://schemas.microsoft.com/office/drawing/2010/main">
+                <a:effectLst>
+                  <a:outerShdw dist="35921" dir="2700000" algn="ctr" rotWithShape="0">
+                    <a:schemeClr val="bg2"/>
+                  </a:outerShdw>
+                </a:effectLst>
+              </a14:hiddenEffects>
+            </a:ext>
+          </a:extLst>
+        </p:spPr>
+        <p:txBody>
+          <a:bodyPr wrap="square">
+            <a:spAutoFit/>
+          </a:bodyPr>
+          <a:lstStyle/>
+          <a:p>
+            <a:pPr>
+              <a:spcBef>
+                <a:spcPct val="50000"/>
+              </a:spcBef>
+            </a:pPr>
+            <a:r>
+              <a:rPr lang="en-US" altLang="en-US" sz="2400" dirty="0">
+                <a:latin typeface="Trebuchet MS" panose="020B0703020202090204" pitchFamily="34" charset="0"/>
+              </a:rPr>
+              <a:t>variable</a:t>
             </a:r>
           </a:p>
         </p:txBody>
@@ -7101,10 +6940,10 @@
       </p:grpSpPr>
       <p:sp>
         <p:nvSpPr>
-          <p:cNvPr id="142338" name="Rectangle 2">
-            <a:extLst>
-              <a:ext uri="{FF2B5EF4-FFF2-40B4-BE49-F238E27FC236}">
-                <a16:creationId xmlns:a16="http://schemas.microsoft.com/office/drawing/2014/main" id="{46B52AAB-F118-C217-6291-81F8C657BD64}"/>
+          <p:cNvPr id="150530" name="Rectangle 2">
+            <a:extLst>
+              <a:ext uri="{FF2B5EF4-FFF2-40B4-BE49-F238E27FC236}">
+                <a16:creationId xmlns:a16="http://schemas.microsoft.com/office/drawing/2014/main" id="{A5E79B40-3EDA-4D58-AA66-05C5DCFA736F}"/>
               </a:ext>
             </a:extLst>
           </p:cNvPr>
@@ -7117,26 +6956,26 @@
         </p:nvSpPr>
         <p:spPr/>
         <p:txBody>
-          <a:bodyPr/>
-          <a:lstStyle/>
-          <a:p>
-            <a:pPr eaLnBrk="1" hangingPunct="1"/>
+          <a:bodyPr vert="horz" lIns="91440" tIns="45720" rIns="91440" bIns="45720" rtlCol="0" anchor="ctr">
+            <a:normAutofit/>
+          </a:bodyPr>
+          <a:lstStyle/>
+          <a:p>
             <a:r>
               <a:rPr lang="en-US" altLang="en-US" dirty="0">
                 <a:latin typeface="Calibri" panose="020F0502020204030204" pitchFamily="34" charset="0"/>
-                <a:cs typeface="Calibri" panose="020F0502020204030204" pitchFamily="34" charset="0"/>
-              </a:rPr>
-              <a:t>int</a:t>
-            </a:r>
-          </a:p>
-        </p:txBody>
-      </p:sp>
-      <p:sp>
-        <p:nvSpPr>
-          <p:cNvPr id="142339" name="Rectangle 3">
-            <a:extLst>
-              <a:ext uri="{FF2B5EF4-FFF2-40B4-BE49-F238E27FC236}">
-                <a16:creationId xmlns:a16="http://schemas.microsoft.com/office/drawing/2014/main" id="{DDF18BB5-0F2E-8DF8-7842-D527BD98D0A1}"/>
+              </a:rPr>
+              <a:t>Declaring variables</a:t>
+            </a:r>
+          </a:p>
+        </p:txBody>
+      </p:sp>
+      <p:sp>
+        <p:nvSpPr>
+          <p:cNvPr id="150531" name="Rectangle 3">
+            <a:extLst>
+              <a:ext uri="{FF2B5EF4-FFF2-40B4-BE49-F238E27FC236}">
+                <a16:creationId xmlns:a16="http://schemas.microsoft.com/office/drawing/2014/main" id="{54B1DA22-3DB3-261B-AA34-B46CCC657D3D}"/>
               </a:ext>
             </a:extLst>
           </p:cNvPr>
@@ -7159,46 +6998,104 @@
               <a:buChar char="o"/>
             </a:pPr>
             <a:r>
-              <a:rPr lang="en-US" altLang="en-US" dirty="0">
-                <a:latin typeface="Calibri" panose="020F0502020204030204" pitchFamily="34" charset="0"/>
-              </a:rPr>
-              <a:t>The most important </a:t>
-            </a:r>
-            <a:r>
-              <a:rPr lang="en-US" altLang="en-US" b="1" dirty="0">
-                <a:latin typeface="Calibri" panose="020F0502020204030204" pitchFamily="34" charset="0"/>
-              </a:rPr>
-              <a:t>integer</a:t>
-            </a:r>
-            <a:r>
-              <a:rPr lang="en-US" altLang="en-US" dirty="0">
-                <a:latin typeface="Calibri" panose="020F0502020204030204" pitchFamily="34" charset="0"/>
-              </a:rPr>
-              <a:t> type is int</a:t>
-            </a:r>
-          </a:p>
-          <a:p>
-            <a:pPr lvl="1"/>
-            <a:r>
-              <a:rPr lang="en-US" altLang="en-US" dirty="0"/>
-              <a:t>An int is a </a:t>
-            </a:r>
-            <a:r>
-              <a:rPr lang="ja-JP" altLang="en-US"/>
-              <a:t>“</a:t>
-            </a:r>
-            <a:r>
-              <a:rPr lang="en-US" altLang="ja-JP" dirty="0"/>
-              <a:t>whole</a:t>
-            </a:r>
-            <a:r>
-              <a:rPr lang="ja-JP" altLang="en-US"/>
-              <a:t>”</a:t>
-            </a:r>
-            <a:r>
-              <a:rPr lang="en-US" altLang="ja-JP" dirty="0"/>
-              <a:t> number (no decimal point)</a:t>
-            </a:r>
+              <a:rPr lang="en-US" dirty="0">
+                <a:latin typeface="Calibri" panose="020F0502020204030204" pitchFamily="34" charset="0"/>
+              </a:rPr>
+              <a:t>Declaration:</a:t>
+            </a:r>
+          </a:p>
+          <a:p>
+            <a:pPr lvl="1">
+              <a:buFont typeface="Courier New" panose="02070309020205020404" pitchFamily="49" charset="0"/>
+              <a:buChar char="o"/>
+            </a:pPr>
+            <a:r>
+              <a:rPr lang="en-US" dirty="0">
+                <a:latin typeface="Calibri" panose="020F0502020204030204" pitchFamily="34" charset="0"/>
+              </a:rPr>
+              <a:t>Datatype </a:t>
+            </a:r>
+            <a:r>
+              <a:rPr lang="en-US" dirty="0" err="1">
+                <a:latin typeface="Calibri" panose="020F0502020204030204" pitchFamily="34" charset="0"/>
+              </a:rPr>
+              <a:t>variableName</a:t>
+            </a:r>
+            <a:r>
+              <a:rPr lang="en-US" dirty="0">
+                <a:latin typeface="Calibri" panose="020F0502020204030204" pitchFamily="34" charset="0"/>
+              </a:rPr>
+              <a:t>;</a:t>
+            </a:r>
+          </a:p>
+          <a:p>
+            <a:pPr lvl="1">
+              <a:buFont typeface="Courier New" panose="02070309020205020404" pitchFamily="49" charset="0"/>
+              <a:buChar char="o"/>
+            </a:pPr>
+            <a:r>
+              <a:rPr lang="en-US" dirty="0" err="1">
+                <a:latin typeface="Calibri" panose="020F0502020204030204" pitchFamily="34" charset="0"/>
+              </a:rPr>
+              <a:t>E.g</a:t>
+            </a:r>
+            <a:r>
+              <a:rPr lang="en-US" dirty="0">
+                <a:latin typeface="Calibri" panose="020F0502020204030204" pitchFamily="34" charset="0"/>
+              </a:rPr>
+              <a:t>: </a:t>
+            </a:r>
+          </a:p>
+          <a:p>
+            <a:pPr lvl="2"/>
+            <a:r>
+              <a:rPr lang="en-US" dirty="0">
+                <a:latin typeface="Calibri" panose="020F0502020204030204" pitchFamily="34" charset="0"/>
+                <a:cs typeface="Calibri" panose="020F0502020204030204" pitchFamily="34" charset="0"/>
+              </a:rPr>
+              <a:t>int </a:t>
+            </a:r>
+            <a:r>
+              <a:rPr lang="en-US" dirty="0" err="1">
+                <a:latin typeface="Calibri" panose="020F0502020204030204" pitchFamily="34" charset="0"/>
+                <a:cs typeface="Calibri" panose="020F0502020204030204" pitchFamily="34" charset="0"/>
+              </a:rPr>
+              <a:t>classSize</a:t>
+            </a:r>
+            <a:r>
+              <a:rPr lang="en-US" dirty="0">
+                <a:latin typeface="Calibri" panose="020F0502020204030204" pitchFamily="34" charset="0"/>
+                <a:cs typeface="Calibri" panose="020F0502020204030204" pitchFamily="34" charset="0"/>
+              </a:rPr>
+              <a:t>;</a:t>
+            </a:r>
+          </a:p>
+          <a:p>
+            <a:pPr lvl="2"/>
+            <a:r>
+              <a:rPr lang="en-US" dirty="0">
+                <a:latin typeface="Calibri" panose="020F0502020204030204" pitchFamily="34" charset="0"/>
+                <a:cs typeface="Calibri" panose="020F0502020204030204" pitchFamily="34" charset="0"/>
+              </a:rPr>
+              <a:t>double </a:t>
+            </a:r>
+            <a:r>
+              <a:rPr lang="en-US" dirty="0" err="1">
+                <a:latin typeface="Calibri" panose="020F0502020204030204" pitchFamily="34" charset="0"/>
+                <a:cs typeface="Calibri" panose="020F0502020204030204" pitchFamily="34" charset="0"/>
+              </a:rPr>
+              <a:t>myBankBalance</a:t>
+            </a:r>
+            <a:r>
+              <a:rPr lang="en-US" dirty="0">
+                <a:latin typeface="Calibri" panose="020F0502020204030204" pitchFamily="34" charset="0"/>
+                <a:cs typeface="Calibri" panose="020F0502020204030204" pitchFamily="34" charset="0"/>
+              </a:rPr>
+              <a:t>;</a:t>
+            </a:r>
+            <a:endParaRPr lang="en-US" dirty="0">
+              <a:latin typeface="Calibri" panose="020F0502020204030204" pitchFamily="34" charset="0"/>
+            </a:endParaRPr>
           </a:p>
           <a:p>
             <a:pPr>
@@ -7206,65 +7103,105 @@
               <a:buChar char="o"/>
             </a:pPr>
             <a:r>
-              <a:rPr lang="en-US" altLang="en-US" dirty="0">
-                <a:latin typeface="Calibri" panose="020F0502020204030204" pitchFamily="34" charset="0"/>
-              </a:rPr>
-              <a:t>Numbers occupy memory in the computer</a:t>
-            </a:r>
-          </a:p>
-          <a:p>
-            <a:pPr lvl="1"/>
-            <a:r>
-              <a:rPr lang="en-US" altLang="en-US" dirty="0"/>
-              <a:t>Larger numeric types require more memory</a:t>
-            </a:r>
-          </a:p>
-          <a:p>
-            <a:pPr lvl="2"/>
-            <a:r>
-              <a:rPr lang="en-US" altLang="en-US" dirty="0"/>
-              <a:t>byte: 1 byte     short: 2 bytes     int: 4 bytes    long: 8 bytes</a:t>
-            </a:r>
-          </a:p>
-          <a:p>
-            <a:pPr lvl="1"/>
-            <a:r>
-              <a:rPr lang="en-US" altLang="en-US" dirty="0"/>
-              <a:t>An int can be between about two billion (two thousand million) and negative two billion</a:t>
-            </a:r>
-          </a:p>
-          <a:p>
-            <a:pPr>
+              <a:rPr lang="en-US" dirty="0">
+                <a:latin typeface="Calibri" panose="020F0502020204030204" pitchFamily="34" charset="0"/>
+              </a:rPr>
+              <a:t>Initialization:</a:t>
+            </a:r>
+          </a:p>
+          <a:p>
+            <a:pPr lvl="1">
               <a:buFont typeface="Courier New" panose="02070309020205020404" pitchFamily="49" charset="0"/>
               <a:buChar char="o"/>
             </a:pPr>
             <a:r>
-              <a:rPr lang="en-US" altLang="en-US" dirty="0">
-                <a:latin typeface="Calibri" panose="020F0502020204030204" pitchFamily="34" charset="0"/>
-              </a:rPr>
-              <a:t>Use </a:t>
-            </a:r>
-            <a:r>
-              <a:rPr lang="en-US" altLang="en-US" b="1" dirty="0">
-                <a:latin typeface="Calibri" panose="020F0502020204030204" pitchFamily="34" charset="0"/>
-              </a:rPr>
-              <a:t>int</a:t>
-            </a:r>
-            <a:r>
-              <a:rPr lang="en-US" altLang="en-US" dirty="0">
-                <a:latin typeface="Calibri" panose="020F0502020204030204" pitchFamily="34" charset="0"/>
-              </a:rPr>
-              <a:t> in preference to other integer types</a:t>
-            </a:r>
-          </a:p>
-          <a:p>
-            <a:pPr>
+              <a:rPr lang="en-US" dirty="0">
+                <a:latin typeface="Calibri" panose="020F0502020204030204" pitchFamily="34" charset="0"/>
+              </a:rPr>
+              <a:t>Datatype </a:t>
+            </a:r>
+            <a:r>
+              <a:rPr lang="en-US" dirty="0" err="1">
+                <a:latin typeface="Calibri" panose="020F0502020204030204" pitchFamily="34" charset="0"/>
+              </a:rPr>
+              <a:t>variableName</a:t>
+            </a:r>
+            <a:r>
+              <a:rPr lang="en-US" dirty="0">
+                <a:latin typeface="Calibri" panose="020F0502020204030204" pitchFamily="34" charset="0"/>
+              </a:rPr>
+              <a:t> = value;</a:t>
+            </a:r>
+          </a:p>
+          <a:p>
+            <a:pPr lvl="1">
               <a:buFont typeface="Courier New" panose="02070309020205020404" pitchFamily="49" charset="0"/>
               <a:buChar char="o"/>
             </a:pPr>
-            <a:endParaRPr lang="en-US" altLang="en-US" dirty="0">
-              <a:latin typeface="Calibri" panose="020F0502020204030204" pitchFamily="34" charset="0"/>
-            </a:endParaRPr>
+            <a:r>
+              <a:rPr lang="en-US" dirty="0" err="1">
+                <a:latin typeface="Calibri" panose="020F0502020204030204" pitchFamily="34" charset="0"/>
+              </a:rPr>
+              <a:t>E.g</a:t>
+            </a:r>
+            <a:r>
+              <a:rPr lang="en-US" dirty="0">
+                <a:latin typeface="Calibri" panose="020F0502020204030204" pitchFamily="34" charset="0"/>
+              </a:rPr>
+              <a:t>:</a:t>
+            </a:r>
+          </a:p>
+          <a:p>
+            <a:pPr lvl="2"/>
+            <a:r>
+              <a:rPr lang="en-US" dirty="0">
+                <a:latin typeface="Calibri" panose="020F0502020204030204" pitchFamily="34" charset="0"/>
+                <a:cs typeface="Calibri" panose="020F0502020204030204" pitchFamily="34" charset="0"/>
+              </a:rPr>
+              <a:t>int </a:t>
+            </a:r>
+            <a:r>
+              <a:rPr lang="en-US" dirty="0" err="1">
+                <a:latin typeface="Calibri" panose="020F0502020204030204" pitchFamily="34" charset="0"/>
+                <a:cs typeface="Calibri" panose="020F0502020204030204" pitchFamily="34" charset="0"/>
+              </a:rPr>
+              <a:t>classSize</a:t>
+            </a:r>
+            <a:r>
+              <a:rPr lang="en-US" dirty="0">
+                <a:latin typeface="Calibri" panose="020F0502020204030204" pitchFamily="34" charset="0"/>
+                <a:cs typeface="Calibri" panose="020F0502020204030204" pitchFamily="34" charset="0"/>
+              </a:rPr>
+              <a:t> = 100;</a:t>
+            </a:r>
+          </a:p>
+          <a:p>
+            <a:pPr lvl="2"/>
+            <a:r>
+              <a:rPr lang="en-US" dirty="0">
+                <a:latin typeface="Calibri" panose="020F0502020204030204" pitchFamily="34" charset="0"/>
+                <a:cs typeface="Calibri" panose="020F0502020204030204" pitchFamily="34" charset="0"/>
+              </a:rPr>
+              <a:t>double </a:t>
+            </a:r>
+            <a:r>
+              <a:rPr lang="en-US" dirty="0" err="1">
+                <a:latin typeface="Calibri" panose="020F0502020204030204" pitchFamily="34" charset="0"/>
+                <a:cs typeface="Calibri" panose="020F0502020204030204" pitchFamily="34" charset="0"/>
+              </a:rPr>
+              <a:t>myBankBalance</a:t>
+            </a:r>
+            <a:r>
+              <a:rPr lang="en-US" dirty="0">
+                <a:latin typeface="Calibri" panose="020F0502020204030204" pitchFamily="34" charset="0"/>
+                <a:cs typeface="Calibri" panose="020F0502020204030204" pitchFamily="34" charset="0"/>
+              </a:rPr>
+              <a:t> = 100;</a:t>
+            </a:r>
+          </a:p>
+          <a:p>
+            <a:pPr lvl="1"/>
+            <a:endParaRPr lang="en-US" dirty="0"/>
           </a:p>
         </p:txBody>
       </p:sp>
@@ -7295,10 +7232,10 @@
       </p:grpSpPr>
       <p:sp>
         <p:nvSpPr>
-          <p:cNvPr id="143362" name="Rectangle 2">
-            <a:extLst>
-              <a:ext uri="{FF2B5EF4-FFF2-40B4-BE49-F238E27FC236}">
-                <a16:creationId xmlns:a16="http://schemas.microsoft.com/office/drawing/2014/main" id="{0EF50CC7-942F-35CA-50A0-6A3CA43E6CC9}"/>
+          <p:cNvPr id="166914" name="Rectangle 2">
+            <a:extLst>
+              <a:ext uri="{FF2B5EF4-FFF2-40B4-BE49-F238E27FC236}">
+                <a16:creationId xmlns:a16="http://schemas.microsoft.com/office/drawing/2014/main" id="{1B0483B0-613F-BF09-143B-4D4D4D8022D3}"/>
               </a:ext>
             </a:extLst>
           </p:cNvPr>
@@ -7311,27 +7248,23 @@
         </p:nvSpPr>
         <p:spPr/>
         <p:txBody>
-          <a:bodyPr>
-            <a:normAutofit/>
-          </a:bodyPr>
+          <a:bodyPr/>
           <a:lstStyle/>
           <a:p>
             <a:pPr eaLnBrk="1" hangingPunct="1"/>
             <a:r>
-              <a:rPr lang="en-US" altLang="en-US" dirty="0">
-                <a:latin typeface="Calibri" panose="020F0502020204030204" pitchFamily="34" charset="0"/>
-              </a:rPr>
-              <a:t>Byte, SHORT</a:t>
-            </a:r>
-          </a:p>
-        </p:txBody>
-      </p:sp>
-      <p:sp>
-        <p:nvSpPr>
-          <p:cNvPr id="143363" name="Rectangle 3">
-            <a:extLst>
-              <a:ext uri="{FF2B5EF4-FFF2-40B4-BE49-F238E27FC236}">
-                <a16:creationId xmlns:a16="http://schemas.microsoft.com/office/drawing/2014/main" id="{94248924-D06C-6D40-58E6-AFDE71AC9E22}"/>
+              <a:rPr lang="en-US" altLang="en-US" dirty="0"/>
+              <a:t>Data Types</a:t>
+            </a:r>
+          </a:p>
+        </p:txBody>
+      </p:sp>
+      <p:sp>
+        <p:nvSpPr>
+          <p:cNvPr id="166915" name="Rectangle 3">
+            <a:extLst>
+              <a:ext uri="{FF2B5EF4-FFF2-40B4-BE49-F238E27FC236}">
+                <a16:creationId xmlns:a16="http://schemas.microsoft.com/office/drawing/2014/main" id="{AC160CDA-A118-6F83-CAA3-E0D483913E7A}"/>
               </a:ext>
             </a:extLst>
           </p:cNvPr>
@@ -7354,22 +7287,46 @@
               <a:buChar char="o"/>
             </a:pPr>
             <a:r>
+              <a:rPr lang="en-US" altLang="en-US" b="1" dirty="0">
+                <a:latin typeface="Calibri" panose="020F0502020204030204" pitchFamily="34" charset="0"/>
+                <a:cs typeface="Calibri" panose="020F0502020204030204" pitchFamily="34" charset="0"/>
+              </a:rPr>
+              <a:t>Primitive types</a:t>
+            </a:r>
+            <a:r>
               <a:rPr lang="en-US" altLang="en-US" dirty="0">
                 <a:latin typeface="Calibri" panose="020F0502020204030204" pitchFamily="34" charset="0"/>
-              </a:rPr>
-              <a:t>A </a:t>
-            </a:r>
-            <a:r>
-              <a:rPr lang="en-US" altLang="en-US" b="1" dirty="0">
-                <a:latin typeface="Calibri" panose="020F0502020204030204" pitchFamily="34" charset="0"/>
-              </a:rPr>
-              <a:t>byte</a:t>
-            </a:r>
-            <a:r>
-              <a:rPr lang="en-US" altLang="en-US" dirty="0">
-                <a:latin typeface="Calibri" panose="020F0502020204030204" pitchFamily="34" charset="0"/>
-              </a:rPr>
-              <a:t> can be between -128 and 127</a:t>
+                <a:cs typeface="Calibri" panose="020F0502020204030204" pitchFamily="34" charset="0"/>
+              </a:rPr>
+              <a:t> are the </a:t>
+            </a:r>
+            <a:r>
+              <a:rPr lang="ja-JP" altLang="en-US">
+                <a:latin typeface="Calibri" panose="020F0502020204030204" pitchFamily="34" charset="0"/>
+                <a:cs typeface="Calibri" panose="020F0502020204030204" pitchFamily="34" charset="0"/>
+              </a:rPr>
+              <a:t>“</a:t>
+            </a:r>
+            <a:r>
+              <a:rPr lang="en-US" altLang="ja-JP" dirty="0">
+                <a:latin typeface="Calibri" panose="020F0502020204030204" pitchFamily="34" charset="0"/>
+                <a:cs typeface="Calibri" panose="020F0502020204030204" pitchFamily="34" charset="0"/>
+              </a:rPr>
+              <a:t>basic</a:t>
+            </a:r>
+            <a:r>
+              <a:rPr lang="ja-JP" altLang="en-US">
+                <a:latin typeface="Calibri" panose="020F0502020204030204" pitchFamily="34" charset="0"/>
+                <a:cs typeface="Calibri" panose="020F0502020204030204" pitchFamily="34" charset="0"/>
+              </a:rPr>
+              <a:t>”</a:t>
+            </a:r>
+            <a:r>
+              <a:rPr lang="en-US" altLang="ja-JP" dirty="0">
+                <a:latin typeface="Calibri" panose="020F0502020204030204" pitchFamily="34" charset="0"/>
+                <a:cs typeface="Calibri" panose="020F0502020204030204" pitchFamily="34" charset="0"/>
+              </a:rPr>
+              <a:t> data values.</a:t>
             </a:r>
           </a:p>
           <a:p>
@@ -7378,22 +7335,46 @@
               <a:buChar char="o"/>
             </a:pPr>
             <a:r>
+              <a:rPr lang="en-US" altLang="en-US" b="1" dirty="0">
+                <a:latin typeface="Calibri" panose="020F0502020204030204" pitchFamily="34" charset="0"/>
+                <a:cs typeface="Calibri" panose="020F0502020204030204" pitchFamily="34" charset="0"/>
+              </a:rPr>
+              <a:t>Reference types</a:t>
+            </a:r>
+            <a:r>
               <a:rPr lang="en-US" altLang="en-US" dirty="0">
                 <a:latin typeface="Calibri" panose="020F0502020204030204" pitchFamily="34" charset="0"/>
-              </a:rPr>
-              <a:t>A </a:t>
-            </a:r>
-            <a:r>
-              <a:rPr lang="en-US" altLang="en-US" b="1" dirty="0">
-                <a:latin typeface="Calibri" panose="020F0502020204030204" pitchFamily="34" charset="0"/>
-              </a:rPr>
-              <a:t>short</a:t>
-            </a:r>
-            <a:r>
-              <a:rPr lang="en-US" altLang="en-US" dirty="0">
-                <a:latin typeface="Calibri" panose="020F0502020204030204" pitchFamily="34" charset="0"/>
-              </a:rPr>
-              <a:t> can be -32768 to 32767</a:t>
+                <a:cs typeface="Calibri" panose="020F0502020204030204" pitchFamily="34" charset="0"/>
+              </a:rPr>
+              <a:t> are </a:t>
+            </a:r>
+            <a:r>
+              <a:rPr lang="ja-JP" altLang="en-US">
+                <a:latin typeface="Calibri" panose="020F0502020204030204" pitchFamily="34" charset="0"/>
+                <a:cs typeface="Calibri" panose="020F0502020204030204" pitchFamily="34" charset="0"/>
+              </a:rPr>
+              <a:t>“</a:t>
+            </a:r>
+            <a:r>
+              <a:rPr lang="en-US" altLang="ja-JP" dirty="0">
+                <a:latin typeface="Calibri" panose="020F0502020204030204" pitchFamily="34" charset="0"/>
+                <a:cs typeface="Calibri" panose="020F0502020204030204" pitchFamily="34" charset="0"/>
+              </a:rPr>
+              <a:t>advanced</a:t>
+            </a:r>
+            <a:r>
+              <a:rPr lang="ja-JP" altLang="en-US">
+                <a:latin typeface="Calibri" panose="020F0502020204030204" pitchFamily="34" charset="0"/>
+                <a:cs typeface="Calibri" panose="020F0502020204030204" pitchFamily="34" charset="0"/>
+              </a:rPr>
+              <a:t>”</a:t>
+            </a:r>
+            <a:r>
+              <a:rPr lang="en-US" altLang="ja-JP" dirty="0">
+                <a:latin typeface="Calibri" panose="020F0502020204030204" pitchFamily="34" charset="0"/>
+                <a:cs typeface="Calibri" panose="020F0502020204030204" pitchFamily="34" charset="0"/>
+              </a:rPr>
+              <a:t> data values that contain address of objects.</a:t>
             </a:r>
           </a:p>
           <a:p>
@@ -7404,22 +7385,56 @@
             <a:r>
               <a:rPr lang="en-US" altLang="en-US" dirty="0">
                 <a:latin typeface="Calibri" panose="020F0502020204030204" pitchFamily="34" charset="0"/>
-              </a:rPr>
-              <a:t>Use byte or short only when</a:t>
+                <a:cs typeface="Calibri" panose="020F0502020204030204" pitchFamily="34" charset="0"/>
+              </a:rPr>
+              <a:t>There are eight types of primitives:</a:t>
             </a:r>
           </a:p>
           <a:p>
             <a:pPr lvl="1"/>
             <a:r>
-              <a:rPr lang="en-US" altLang="en-US" dirty="0"/>
-              <a:t>You know the numbers are all small</a:t>
+              <a:rPr lang="en-US" altLang="en-US" dirty="0" err="1">
+                <a:latin typeface="Calibri" panose="020F0502020204030204" pitchFamily="34" charset="0"/>
+                <a:cs typeface="Calibri" panose="020F0502020204030204" pitchFamily="34" charset="0"/>
+              </a:rPr>
+              <a:t>boolean</a:t>
+            </a:r>
+            <a:r>
+              <a:rPr lang="en-US" altLang="en-US" dirty="0">
+                <a:latin typeface="Calibri" panose="020F0502020204030204" pitchFamily="34" charset="0"/>
+                <a:cs typeface="Calibri" panose="020F0502020204030204" pitchFamily="34" charset="0"/>
+              </a:rPr>
+              <a:t> -- used for true and false values</a:t>
             </a:r>
           </a:p>
           <a:p>
             <a:pPr lvl="1"/>
             <a:r>
-              <a:rPr lang="en-US" altLang="en-US" dirty="0"/>
-              <a:t>There are millions of numbers to remember</a:t>
+              <a:rPr lang="en-US" altLang="en-US" dirty="0">
+                <a:latin typeface="Calibri" panose="020F0502020204030204" pitchFamily="34" charset="0"/>
+                <a:cs typeface="Calibri" panose="020F0502020204030204" pitchFamily="34" charset="0"/>
+              </a:rPr>
+              <a:t>char -- used for single characters (letters, etc.)</a:t>
+            </a:r>
+          </a:p>
+          <a:p>
+            <a:pPr lvl="1"/>
+            <a:r>
+              <a:rPr lang="en-US" altLang="en-US" dirty="0">
+                <a:latin typeface="Calibri" panose="020F0502020204030204" pitchFamily="34" charset="0"/>
+                <a:cs typeface="Calibri" panose="020F0502020204030204" pitchFamily="34" charset="0"/>
+              </a:rPr>
+              <a:t>byte, short, int, long -- four different kinds of integer (whole number) values</a:t>
+            </a:r>
+          </a:p>
+          <a:p>
+            <a:pPr lvl="1"/>
+            <a:r>
+              <a:rPr lang="en-US" altLang="en-US" dirty="0">
+                <a:latin typeface="Calibri" panose="020F0502020204030204" pitchFamily="34" charset="0"/>
+                <a:cs typeface="Calibri" panose="020F0502020204030204" pitchFamily="34" charset="0"/>
+              </a:rPr>
+              <a:t>float, double -- two different kinds of decimal numbers (numbers with a decimal point)</a:t>
             </a:r>
           </a:p>
         </p:txBody>
@@ -7451,10 +7466,10 @@
       </p:grpSpPr>
       <p:sp>
         <p:nvSpPr>
-          <p:cNvPr id="144386" name="Rectangle 2">
-            <a:extLst>
-              <a:ext uri="{FF2B5EF4-FFF2-40B4-BE49-F238E27FC236}">
-                <a16:creationId xmlns:a16="http://schemas.microsoft.com/office/drawing/2014/main" id="{C6ED462E-AFCD-C366-F7B0-769DCD236E8C}"/>
+          <p:cNvPr id="142338" name="Rectangle 2">
+            <a:extLst>
+              <a:ext uri="{FF2B5EF4-FFF2-40B4-BE49-F238E27FC236}">
+                <a16:creationId xmlns:a16="http://schemas.microsoft.com/office/drawing/2014/main" id="{46B52AAB-F118-C217-6291-81F8C657BD64}"/>
               </a:ext>
             </a:extLst>
           </p:cNvPr>
@@ -7467,26 +7482,25 @@
         </p:nvSpPr>
         <p:spPr/>
         <p:txBody>
-          <a:bodyPr vert="horz" lIns="91440" tIns="45720" rIns="91440" bIns="45720" rtlCol="0" anchor="ctr">
+          <a:bodyPr>
             <a:normAutofit/>
           </a:bodyPr>
           <a:lstStyle/>
           <a:p>
-            <a:r>
-              <a:rPr lang="en-US" altLang="en-US" dirty="0">
-                <a:latin typeface="Calibri" panose="020F0502020204030204" pitchFamily="34" charset="0"/>
-              </a:rPr>
-              <a:t>long</a:t>
-            </a:r>
-          </a:p>
-        </p:txBody>
-      </p:sp>
-      <p:sp>
-        <p:nvSpPr>
-          <p:cNvPr id="144387" name="Rectangle 3">
-            <a:extLst>
-              <a:ext uri="{FF2B5EF4-FFF2-40B4-BE49-F238E27FC236}">
-                <a16:creationId xmlns:a16="http://schemas.microsoft.com/office/drawing/2014/main" id="{CFDBF581-AAD2-0828-28D8-4937C3789B33}"/>
+            <a:pPr eaLnBrk="1" hangingPunct="1"/>
+            <a:r>
+              <a:rPr lang="en-US" altLang="en-US" dirty="0"/>
+              <a:t>int</a:t>
+            </a:r>
+          </a:p>
+        </p:txBody>
+      </p:sp>
+      <p:sp>
+        <p:nvSpPr>
+          <p:cNvPr id="142339" name="Rectangle 3">
+            <a:extLst>
+              <a:ext uri="{FF2B5EF4-FFF2-40B4-BE49-F238E27FC236}">
+                <a16:creationId xmlns:a16="http://schemas.microsoft.com/office/drawing/2014/main" id="{DDF18BB5-0F2E-8DF8-7842-D527BD98D0A1}"/>
               </a:ext>
             </a:extLst>
           </p:cNvPr>
@@ -7509,34 +7523,45 @@
               <a:buChar char="o"/>
             </a:pPr>
             <a:r>
+              <a:rPr lang="en-US" altLang="en-US" dirty="0">
+                <a:latin typeface="Calibri" panose="020F0502020204030204" pitchFamily="34" charset="0"/>
+              </a:rPr>
+              <a:t>The most important </a:t>
+            </a:r>
+            <a:r>
               <a:rPr lang="en-US" altLang="en-US" b="1" dirty="0">
                 <a:latin typeface="Calibri" panose="020F0502020204030204" pitchFamily="34" charset="0"/>
               </a:rPr>
-              <a:t> Long</a:t>
+              <a:t>integer</a:t>
             </a:r>
             <a:r>
               <a:rPr lang="en-US" altLang="en-US" dirty="0">
                 <a:latin typeface="Calibri" panose="020F0502020204030204" pitchFamily="34" charset="0"/>
               </a:rPr>
-              <a:t> integers are for when two billion </a:t>
-            </a:r>
-            <a:r>
-              <a:rPr lang="en-US" altLang="en-US" dirty="0" err="1">
-                <a:latin typeface="Calibri" panose="020F0502020204030204" pitchFamily="34" charset="0"/>
-              </a:rPr>
-              <a:t>isn</a:t>
-            </a:r>
-            <a:r>
-              <a:rPr lang="ja-JP" altLang="en-US">
-                <a:latin typeface="Calibri" panose="020F0502020204030204" pitchFamily="34" charset="0"/>
-              </a:rPr>
-              <a:t>’</a:t>
-            </a:r>
-            <a:r>
-              <a:rPr lang="en-US" altLang="ja-JP" dirty="0">
-                <a:latin typeface="Calibri" panose="020F0502020204030204" pitchFamily="34" charset="0"/>
-              </a:rPr>
-              <a:t>t large enough for your needs</a:t>
+              <a:t> type is int</a:t>
+            </a:r>
+          </a:p>
+          <a:p>
+            <a:pPr lvl="1"/>
+            <a:r>
+              <a:rPr lang="en-US" altLang="en-US" dirty="0"/>
+              <a:t>An int is a </a:t>
+            </a:r>
+            <a:r>
+              <a:rPr lang="ja-JP" altLang="en-US"/>
+              <a:t>“</a:t>
+            </a:r>
+            <a:r>
+              <a:rPr lang="en-US" altLang="ja-JP" dirty="0"/>
+              <a:t>whole</a:t>
+            </a:r>
+            <a:r>
+              <a:rPr lang="ja-JP" altLang="en-US"/>
+              <a:t>”</a:t>
+            </a:r>
+            <a:r>
+              <a:rPr lang="en-US" altLang="ja-JP" dirty="0"/>
+              <a:t> number (no decimal point)</a:t>
             </a:r>
           </a:p>
           <a:p>
@@ -7548,7 +7573,28 @@
               <a:rPr lang="en-US" altLang="en-US" dirty="0">
                 <a:latin typeface="Calibri" panose="020F0502020204030204" pitchFamily="34" charset="0"/>
               </a:rPr>
-              <a:t>A long can be about 19 digits</a:t>
+              <a:t>Numbers occupy memory in the computer</a:t>
+            </a:r>
+          </a:p>
+          <a:p>
+            <a:pPr lvl="1"/>
+            <a:r>
+              <a:rPr lang="en-US" altLang="en-US" dirty="0"/>
+              <a:t>Larger numeric types require more memory</a:t>
+            </a:r>
+          </a:p>
+          <a:p>
+            <a:pPr lvl="2"/>
+            <a:r>
+              <a:rPr lang="en-US" altLang="en-US" dirty="0"/>
+              <a:t>byte: 1 byte     short: 2 bytes     int: 4 bytes    long: 8 bytes</a:t>
+            </a:r>
+          </a:p>
+          <a:p>
+            <a:pPr lvl="1"/>
+            <a:r>
+              <a:rPr lang="en-US" altLang="en-US" dirty="0"/>
+              <a:t>An int can be between about two billion (two thousand million) and negative two billion</a:t>
             </a:r>
           </a:p>
           <a:p>
@@ -7560,7 +7606,19 @@
               <a:rPr lang="en-US" altLang="en-US" dirty="0">
                 <a:latin typeface="Calibri" panose="020F0502020204030204" pitchFamily="34" charset="0"/>
               </a:rPr>
-              <a:t>A long occupies twice as much space as an int</a:t>
+              <a:t>Use </a:t>
+            </a:r>
+            <a:r>
+              <a:rPr lang="en-US" altLang="en-US" b="1" dirty="0">
+                <a:latin typeface="Calibri" panose="020F0502020204030204" pitchFamily="34" charset="0"/>
+              </a:rPr>
+              <a:t>int</a:t>
+            </a:r>
+            <a:r>
+              <a:rPr lang="en-US" altLang="en-US" dirty="0">
+                <a:latin typeface="Calibri" panose="020F0502020204030204" pitchFamily="34" charset="0"/>
+              </a:rPr>
+              <a:t> in preference to other integer types</a:t>
             </a:r>
           </a:p>
           <a:p>
@@ -7568,24 +7626,9 @@
               <a:buFont typeface="Courier New" panose="02070309020205020404" pitchFamily="49" charset="0"/>
               <a:buChar char="o"/>
             </a:pPr>
-            <a:r>
-              <a:rPr lang="en-US" altLang="en-US" dirty="0">
-                <a:latin typeface="Calibri" panose="020F0502020204030204" pitchFamily="34" charset="0"/>
-              </a:rPr>
-              <a:t>Arithmetic on long values is slower</a:t>
-            </a:r>
-          </a:p>
-          <a:p>
-            <a:pPr>
-              <a:buFont typeface="Courier New" panose="02070309020205020404" pitchFamily="49" charset="0"/>
-              <a:buChar char="o"/>
-            </a:pPr>
-            <a:r>
-              <a:rPr lang="en-US" altLang="en-US" dirty="0">
-                <a:latin typeface="Calibri" panose="020F0502020204030204" pitchFamily="34" charset="0"/>
-              </a:rPr>
-              <a:t>Use long only when you need big numbers</a:t>
-            </a:r>
+            <a:endParaRPr lang="en-US" altLang="en-US" dirty="0">
+              <a:latin typeface="Calibri" panose="020F0502020204030204" pitchFamily="34" charset="0"/>
+            </a:endParaRPr>
           </a:p>
         </p:txBody>
       </p:sp>
@@ -7616,10 +7659,10 @@
       </p:grpSpPr>
       <p:sp>
         <p:nvSpPr>
-          <p:cNvPr id="145410" name="Rectangle 2">
-            <a:extLst>
-              <a:ext uri="{FF2B5EF4-FFF2-40B4-BE49-F238E27FC236}">
-                <a16:creationId xmlns:a16="http://schemas.microsoft.com/office/drawing/2014/main" id="{F6938535-A4FA-1CF7-26BD-648D733BFFD3}"/>
+          <p:cNvPr id="143362" name="Rectangle 2">
+            <a:extLst>
+              <a:ext uri="{FF2B5EF4-FFF2-40B4-BE49-F238E27FC236}">
+                <a16:creationId xmlns:a16="http://schemas.microsoft.com/office/drawing/2014/main" id="{0EF50CC7-942F-35CA-50A0-6A3CA43E6CC9}"/>
               </a:ext>
             </a:extLst>
           </p:cNvPr>
@@ -7632,26 +7675,25 @@
         </p:nvSpPr>
         <p:spPr/>
         <p:txBody>
-          <a:bodyPr vert="horz" lIns="91440" tIns="45720" rIns="91440" bIns="45720" rtlCol="0" anchor="ctr">
+          <a:bodyPr>
             <a:normAutofit/>
           </a:bodyPr>
           <a:lstStyle/>
           <a:p>
-            <a:r>
-              <a:rPr lang="en-US" altLang="en-US" dirty="0">
-                <a:latin typeface="Calibri" panose="020F0502020204030204" pitchFamily="34" charset="0"/>
-              </a:rPr>
-              <a:t>double</a:t>
-            </a:r>
-          </a:p>
-        </p:txBody>
-      </p:sp>
-      <p:sp>
-        <p:nvSpPr>
-          <p:cNvPr id="145411" name="Rectangle 3">
-            <a:extLst>
-              <a:ext uri="{FF2B5EF4-FFF2-40B4-BE49-F238E27FC236}">
-                <a16:creationId xmlns:a16="http://schemas.microsoft.com/office/drawing/2014/main" id="{5610CFBB-3F2C-7B61-A471-0DC499489847}"/>
+            <a:pPr eaLnBrk="1" hangingPunct="1"/>
+            <a:r>
+              <a:rPr lang="en-US" altLang="en-US" dirty="0"/>
+              <a:t>byte, short</a:t>
+            </a:r>
+          </a:p>
+        </p:txBody>
+      </p:sp>
+      <p:sp>
+        <p:nvSpPr>
+          <p:cNvPr id="143363" name="Rectangle 3">
+            <a:extLst>
+              <a:ext uri="{FF2B5EF4-FFF2-40B4-BE49-F238E27FC236}">
+                <a16:creationId xmlns:a16="http://schemas.microsoft.com/office/drawing/2014/main" id="{94248924-D06C-6D40-58E6-AFDE71AC9E22}"/>
               </a:ext>
             </a:extLst>
           </p:cNvPr>
@@ -7683,64 +7725,13 @@
               <a:rPr lang="en-US" altLang="en-US" b="1" dirty="0">
                 <a:latin typeface="Calibri" panose="020F0502020204030204" pitchFamily="34" charset="0"/>
               </a:rPr>
-              <a:t>double</a:t>
+              <a:t>byte</a:t>
             </a:r>
             <a:r>
               <a:rPr lang="en-US" altLang="en-US" dirty="0">
                 <a:latin typeface="Calibri" panose="020F0502020204030204" pitchFamily="34" charset="0"/>
               </a:rPr>
-              <a:t> represents a </a:t>
-            </a:r>
-            <a:r>
-              <a:rPr lang="ja-JP" altLang="en-US">
-                <a:latin typeface="Calibri" panose="020F0502020204030204" pitchFamily="34" charset="0"/>
-              </a:rPr>
-              <a:t>“</a:t>
-            </a:r>
-            <a:r>
-              <a:rPr lang="en-US" altLang="ja-JP" dirty="0">
-                <a:latin typeface="Calibri" panose="020F0502020204030204" pitchFamily="34" charset="0"/>
-              </a:rPr>
-              <a:t>real</a:t>
-            </a:r>
-            <a:r>
-              <a:rPr lang="ja-JP" altLang="en-US">
-                <a:latin typeface="Calibri" panose="020F0502020204030204" pitchFamily="34" charset="0"/>
-              </a:rPr>
-              <a:t>”</a:t>
-            </a:r>
-            <a:r>
-              <a:rPr lang="en-US" altLang="ja-JP" dirty="0">
-                <a:latin typeface="Calibri" panose="020F0502020204030204" pitchFamily="34" charset="0"/>
-              </a:rPr>
-              <a:t> number</a:t>
-            </a:r>
-          </a:p>
-          <a:p>
-            <a:pPr lvl="1"/>
-            <a:r>
-              <a:rPr lang="en-US" altLang="en-US" dirty="0"/>
-              <a:t>Also sometimes called </a:t>
-            </a:r>
-            <a:r>
-              <a:rPr lang="ja-JP" altLang="en-US"/>
-              <a:t>“</a:t>
-            </a:r>
-            <a:r>
-              <a:rPr lang="en-US" altLang="ja-JP" dirty="0"/>
-              <a:t>floating point</a:t>
-            </a:r>
-            <a:r>
-              <a:rPr lang="ja-JP" altLang="en-US"/>
-              <a:t>”</a:t>
-            </a:r>
-            <a:endParaRPr lang="en-US" altLang="ja-JP" dirty="0"/>
-          </a:p>
-          <a:p>
-            <a:pPr lvl="1"/>
-            <a:r>
-              <a:rPr lang="en-US" altLang="en-US" dirty="0"/>
-              <a:t>These are numbers with a decimal point</a:t>
+              <a:t> can be between -128 and 127</a:t>
             </a:r>
           </a:p>
           <a:p>
@@ -7752,7 +7743,19 @@
               <a:rPr lang="en-US" altLang="en-US" dirty="0">
                 <a:latin typeface="Calibri" panose="020F0502020204030204" pitchFamily="34" charset="0"/>
               </a:rPr>
-              <a:t>A double has about 15 digits of accuracy</a:t>
+              <a:t>A </a:t>
+            </a:r>
+            <a:r>
+              <a:rPr lang="en-US" altLang="en-US" b="1" dirty="0">
+                <a:latin typeface="Calibri" panose="020F0502020204030204" pitchFamily="34" charset="0"/>
+              </a:rPr>
+              <a:t>short</a:t>
+            </a:r>
+            <a:r>
+              <a:rPr lang="en-US" altLang="en-US" dirty="0">
+                <a:latin typeface="Calibri" panose="020F0502020204030204" pitchFamily="34" charset="0"/>
+              </a:rPr>
+              <a:t> can be -32768 to 32767</a:t>
             </a:r>
           </a:p>
           <a:p>
@@ -7764,29 +7767,22 @@
               <a:rPr lang="en-US" altLang="en-US" dirty="0">
                 <a:latin typeface="Calibri" panose="020F0502020204030204" pitchFamily="34" charset="0"/>
               </a:rPr>
-              <a:t>If you just write a real number, such as 1.37, Java assumes it is a double</a:t>
-            </a:r>
-          </a:p>
-          <a:p>
-            <a:pPr>
-              <a:buFont typeface="Courier New" panose="02070309020205020404" pitchFamily="49" charset="0"/>
-              <a:buChar char="o"/>
-            </a:pPr>
-            <a:r>
-              <a:rPr lang="en-US" altLang="en-US" dirty="0">
-                <a:latin typeface="Calibri" panose="020F0502020204030204" pitchFamily="34" charset="0"/>
-              </a:rPr>
-              <a:t>Use double in preference to float</a:t>
-            </a:r>
-          </a:p>
-          <a:p>
-            <a:pPr>
-              <a:buFont typeface="Courier New" panose="02070309020205020404" pitchFamily="49" charset="0"/>
-              <a:buChar char="o"/>
-            </a:pPr>
-            <a:endParaRPr lang="en-US" altLang="en-US" dirty="0">
-              <a:latin typeface="Calibri" panose="020F0502020204030204" pitchFamily="34" charset="0"/>
-            </a:endParaRPr>
+              <a:t>Use byte or short only when</a:t>
+            </a:r>
+          </a:p>
+          <a:p>
+            <a:pPr lvl="1"/>
+            <a:r>
+              <a:rPr lang="en-US" altLang="en-US" dirty="0"/>
+              <a:t>You know the numbers are all small</a:t>
+            </a:r>
+          </a:p>
+          <a:p>
+            <a:pPr lvl="1"/>
+            <a:r>
+              <a:rPr lang="en-US" altLang="en-US" dirty="0"/>
+              <a:t>There are millions of numbers to remember</a:t>
+            </a:r>
           </a:p>
         </p:txBody>
       </p:sp>
@@ -7817,10 +7813,10 @@
       </p:grpSpPr>
       <p:sp>
         <p:nvSpPr>
-          <p:cNvPr id="146434" name="Rectangle 2">
-            <a:extLst>
-              <a:ext uri="{FF2B5EF4-FFF2-40B4-BE49-F238E27FC236}">
-                <a16:creationId xmlns:a16="http://schemas.microsoft.com/office/drawing/2014/main" id="{83D49567-A32A-13EB-69BD-5C9C851B9FDB}"/>
+          <p:cNvPr id="144386" name="Rectangle 2">
+            <a:extLst>
+              <a:ext uri="{FF2B5EF4-FFF2-40B4-BE49-F238E27FC236}">
+                <a16:creationId xmlns:a16="http://schemas.microsoft.com/office/drawing/2014/main" id="{C6ED462E-AFCD-C366-F7B0-769DCD236E8C}"/>
               </a:ext>
             </a:extLst>
           </p:cNvPr>
@@ -7839,20 +7835,18 @@
           <a:lstStyle/>
           <a:p>
             <a:r>
-              <a:rPr lang="en-US" altLang="en-US" dirty="0">
-                <a:latin typeface="Calibri" panose="020F0502020204030204" pitchFamily="34" charset="0"/>
-              </a:rPr>
-              <a:t>float</a:t>
-            </a:r>
-          </a:p>
-        </p:txBody>
-      </p:sp>
-      <p:sp>
-        <p:nvSpPr>
-          <p:cNvPr id="146435" name="Rectangle 3">
-            <a:extLst>
-              <a:ext uri="{FF2B5EF4-FFF2-40B4-BE49-F238E27FC236}">
-                <a16:creationId xmlns:a16="http://schemas.microsoft.com/office/drawing/2014/main" id="{3D67686E-1BE1-9B19-13B3-1128DEFBDA6F}"/>
+              <a:rPr lang="en-US" altLang="en-US" dirty="0"/>
+              <a:t>long</a:t>
+            </a:r>
+          </a:p>
+        </p:txBody>
+      </p:sp>
+      <p:sp>
+        <p:nvSpPr>
+          <p:cNvPr id="144387" name="Rectangle 3">
+            <a:extLst>
+              <a:ext uri="{FF2B5EF4-FFF2-40B4-BE49-F238E27FC236}">
+                <a16:creationId xmlns:a16="http://schemas.microsoft.com/office/drawing/2014/main" id="{CFDBF581-AAD2-0828-28D8-4937C3789B33}"/>
               </a:ext>
             </a:extLst>
           </p:cNvPr>
@@ -7878,61 +7872,31 @@
               <a:rPr lang="en-US" altLang="en-US" b="1" dirty="0">
                 <a:latin typeface="Calibri" panose="020F0502020204030204" pitchFamily="34" charset="0"/>
               </a:rPr>
-              <a:t>Float</a:t>
+              <a:t> Long</a:t>
             </a:r>
             <a:r>
               <a:rPr lang="en-US" altLang="en-US" dirty="0">
                 <a:latin typeface="Calibri" panose="020F0502020204030204" pitchFamily="34" charset="0"/>
               </a:rPr>
-              <a:t> is the other kind of </a:t>
+              <a:t> integers are for when two billion </a:t>
+            </a:r>
+            <a:r>
+              <a:rPr lang="en-US" altLang="en-US" dirty="0" err="1">
+                <a:latin typeface="Calibri" panose="020F0502020204030204" pitchFamily="34" charset="0"/>
+              </a:rPr>
+              <a:t>isn</a:t>
             </a:r>
             <a:r>
               <a:rPr lang="ja-JP" altLang="en-US">
                 <a:latin typeface="Calibri" panose="020F0502020204030204" pitchFamily="34" charset="0"/>
               </a:rPr>
-              <a:t>“</a:t>
+              <a:t>’</a:t>
             </a:r>
             <a:r>
               <a:rPr lang="en-US" altLang="ja-JP" dirty="0">
                 <a:latin typeface="Calibri" panose="020F0502020204030204" pitchFamily="34" charset="0"/>
               </a:rPr>
-              <a:t>real,</a:t>
-            </a:r>
-            <a:r>
-              <a:rPr lang="ja-JP" altLang="en-US">
-                <a:latin typeface="Calibri" panose="020F0502020204030204" pitchFamily="34" charset="0"/>
-              </a:rPr>
-              <a:t>”</a:t>
-            </a:r>
-            <a:r>
-              <a:rPr lang="en-US" altLang="ja-JP" dirty="0">
-                <a:latin typeface="Calibri" panose="020F0502020204030204" pitchFamily="34" charset="0"/>
-              </a:rPr>
-              <a:t> or </a:t>
-            </a:r>
-            <a:r>
-              <a:rPr lang="ja-JP" altLang="en-US">
-                <a:latin typeface="Calibri" panose="020F0502020204030204" pitchFamily="34" charset="0"/>
-              </a:rPr>
-              <a:t>“</a:t>
-            </a:r>
-            <a:r>
-              <a:rPr lang="en-US" altLang="ja-JP" dirty="0">
-                <a:latin typeface="Calibri" panose="020F0502020204030204" pitchFamily="34" charset="0"/>
-              </a:rPr>
-              <a:t>floating point</a:t>
-            </a:r>
-            <a:r>
-              <a:rPr lang="ja-JP" altLang="en-US">
-                <a:latin typeface="Calibri" panose="020F0502020204030204" pitchFamily="34" charset="0"/>
-              </a:rPr>
-              <a:t>”</a:t>
-            </a:r>
-            <a:r>
-              <a:rPr lang="en-US" altLang="ja-JP" dirty="0">
-                <a:latin typeface="Calibri" panose="020F0502020204030204" pitchFamily="34" charset="0"/>
-              </a:rPr>
-              <a:t> number</a:t>
+              <a:t>t large enough for your needs</a:t>
             </a:r>
           </a:p>
           <a:p>
@@ -7944,7 +7908,7 @@
               <a:rPr lang="en-US" altLang="en-US" dirty="0">
                 <a:latin typeface="Calibri" panose="020F0502020204030204" pitchFamily="34" charset="0"/>
               </a:rPr>
-              <a:t>float has about 8 digits of accuracy</a:t>
+              <a:t>A long can be about 19 digits</a:t>
             </a:r>
           </a:p>
           <a:p>
@@ -7956,7 +7920,7 @@
               <a:rPr lang="en-US" altLang="en-US" dirty="0">
                 <a:latin typeface="Calibri" panose="020F0502020204030204" pitchFamily="34" charset="0"/>
               </a:rPr>
-              <a:t>Arithmetic with float is not faster</a:t>
+              <a:t>A long occupies twice as much space as an int</a:t>
             </a:r>
           </a:p>
           <a:p>
@@ -7968,7 +7932,19 @@
               <a:rPr lang="en-US" altLang="en-US" dirty="0">
                 <a:latin typeface="Calibri" panose="020F0502020204030204" pitchFamily="34" charset="0"/>
               </a:rPr>
-              <a:t>Use float only to save space when there are millions of numbers involved</a:t>
+              <a:t>Arithmetic on long values is slower</a:t>
+            </a:r>
+          </a:p>
+          <a:p>
+            <a:pPr>
+              <a:buFont typeface="Courier New" panose="02070309020205020404" pitchFamily="49" charset="0"/>
+              <a:buChar char="o"/>
+            </a:pPr>
+            <a:r>
+              <a:rPr lang="en-US" altLang="en-US" dirty="0">
+                <a:latin typeface="Calibri" panose="020F0502020204030204" pitchFamily="34" charset="0"/>
+              </a:rPr>
+              <a:t>Use long only when you need big numbers</a:t>
             </a:r>
           </a:p>
         </p:txBody>
@@ -8000,10 +7976,10 @@
       </p:grpSpPr>
       <p:sp>
         <p:nvSpPr>
-          <p:cNvPr id="148482" name="Rectangle 2">
-            <a:extLst>
-              <a:ext uri="{FF2B5EF4-FFF2-40B4-BE49-F238E27FC236}">
-                <a16:creationId xmlns:a16="http://schemas.microsoft.com/office/drawing/2014/main" id="{F831B61D-58C3-B218-4023-E2ACC5861AFB}"/>
+          <p:cNvPr id="145410" name="Rectangle 2">
+            <a:extLst>
+              <a:ext uri="{FF2B5EF4-FFF2-40B4-BE49-F238E27FC236}">
+                <a16:creationId xmlns:a16="http://schemas.microsoft.com/office/drawing/2014/main" id="{F6938535-A4FA-1CF7-26BD-648D733BFFD3}"/>
               </a:ext>
             </a:extLst>
           </p:cNvPr>
@@ -8016,26 +7992,24 @@
         </p:nvSpPr>
         <p:spPr/>
         <p:txBody>
-          <a:bodyPr/>
-          <a:lstStyle/>
-          <a:p>
-            <a:pPr eaLnBrk="1" hangingPunct="1"/>
-            <a:r>
-              <a:rPr lang="en-US" altLang="en-US" dirty="0">
-                <a:latin typeface="Calibri" panose="020F0502020204030204" pitchFamily="34" charset="0"/>
-              </a:rPr>
-              <a:t>Variables</a:t>
-            </a:r>
-            <a:endParaRPr lang="en-US" altLang="en-US" dirty="0"/>
-          </a:p>
-        </p:txBody>
-      </p:sp>
-      <p:sp>
-        <p:nvSpPr>
-          <p:cNvPr id="148483" name="Rectangle 3">
-            <a:extLst>
-              <a:ext uri="{FF2B5EF4-FFF2-40B4-BE49-F238E27FC236}">
-                <a16:creationId xmlns:a16="http://schemas.microsoft.com/office/drawing/2014/main" id="{56EC4E77-B869-C753-93BB-9C42137187A0}"/>
+          <a:bodyPr vert="horz" lIns="91440" tIns="45720" rIns="91440" bIns="45720" rtlCol="0" anchor="ctr">
+            <a:normAutofit/>
+          </a:bodyPr>
+          <a:lstStyle/>
+          <a:p>
+            <a:r>
+              <a:rPr lang="en-US" altLang="en-US" dirty="0"/>
+              <a:t>double</a:t>
+            </a:r>
+          </a:p>
+        </p:txBody>
+      </p:sp>
+      <p:sp>
+        <p:nvSpPr>
+          <p:cNvPr id="145411" name="Rectangle 3">
+            <a:extLst>
+              <a:ext uri="{FF2B5EF4-FFF2-40B4-BE49-F238E27FC236}">
+                <a16:creationId xmlns:a16="http://schemas.microsoft.com/office/drawing/2014/main" id="{5610CFBB-3F2C-7B61-A471-0DC499489847}"/>
               </a:ext>
             </a:extLst>
           </p:cNvPr>
@@ -8046,15 +8020,10 @@
             <p:ph idx="1"/>
           </p:nvPr>
         </p:nvSpPr>
-        <p:spPr>
-          <a:xfrm>
-            <a:off x="1981201" y="2084832"/>
-            <a:ext cx="7600951" cy="4224528"/>
-          </a:xfrm>
-        </p:spPr>
+        <p:spPr/>
         <p:txBody>
           <a:bodyPr vert="horz" lIns="45720" tIns="45720" rIns="45720" bIns="45720" rtlCol="0">
-            <a:normAutofit fontScale="92500" lnSpcReduction="20000"/>
+            <a:normAutofit/>
           </a:bodyPr>
           <a:lstStyle/>
           <a:p>
@@ -8063,10 +8032,73 @@
               <a:buChar char="o"/>
             </a:pPr>
             <a:r>
-              <a:rPr lang="en-US" dirty="0">
-                <a:latin typeface="Calibri" panose="020F0502020204030204" pitchFamily="34" charset="0"/>
-              </a:rPr>
-              <a:t>Variable in Java is a data container that saves the data values during Java program execution.</a:t>
+              <a:rPr lang="en-US" altLang="en-US" dirty="0">
+                <a:latin typeface="Calibri" panose="020F0502020204030204" pitchFamily="34" charset="0"/>
+              </a:rPr>
+              <a:t>A </a:t>
+            </a:r>
+            <a:r>
+              <a:rPr lang="en-US" altLang="en-US" b="1" dirty="0">
+                <a:latin typeface="Calibri" panose="020F0502020204030204" pitchFamily="34" charset="0"/>
+              </a:rPr>
+              <a:t>double</a:t>
+            </a:r>
+            <a:r>
+              <a:rPr lang="en-US" altLang="en-US" dirty="0">
+                <a:latin typeface="Calibri" panose="020F0502020204030204" pitchFamily="34" charset="0"/>
+              </a:rPr>
+              <a:t> represents a </a:t>
+            </a:r>
+            <a:r>
+              <a:rPr lang="ja-JP" altLang="en-US">
+                <a:latin typeface="Calibri" panose="020F0502020204030204" pitchFamily="34" charset="0"/>
+              </a:rPr>
+              <a:t>“</a:t>
+            </a:r>
+            <a:r>
+              <a:rPr lang="en-US" altLang="ja-JP" dirty="0">
+                <a:latin typeface="Calibri" panose="020F0502020204030204" pitchFamily="34" charset="0"/>
+              </a:rPr>
+              <a:t>real</a:t>
+            </a:r>
+            <a:r>
+              <a:rPr lang="ja-JP" altLang="en-US">
+                <a:latin typeface="Calibri" panose="020F0502020204030204" pitchFamily="34" charset="0"/>
+              </a:rPr>
+              <a:t>”</a:t>
+            </a:r>
+            <a:r>
+              <a:rPr lang="en-US" altLang="ja-JP" dirty="0">
+                <a:latin typeface="Calibri" panose="020F0502020204030204" pitchFamily="34" charset="0"/>
+              </a:rPr>
+              <a:t> number</a:t>
+            </a:r>
+          </a:p>
+          <a:p>
+            <a:pPr lvl="1"/>
+            <a:r>
+              <a:rPr lang="en-US" altLang="en-US" dirty="0"/>
+              <a:t>Also sometimes called </a:t>
+            </a:r>
+            <a:r>
+              <a:rPr lang="ja-JP" altLang="en-US"/>
+              <a:t>“</a:t>
+            </a:r>
+            <a:r>
+              <a:rPr lang="en-US" altLang="ja-JP" dirty="0"/>
+              <a:t>floating point</a:t>
+            </a:r>
+            <a:r>
+              <a:rPr lang="ja-JP" altLang="en-US"/>
+              <a:t>”</a:t>
+            </a:r>
+            <a:endParaRPr lang="en-US" altLang="ja-JP" dirty="0"/>
+          </a:p>
+          <a:p>
+            <a:pPr lvl="1"/>
+            <a:r>
+              <a:rPr lang="en-US" altLang="en-US" dirty="0"/>
+              <a:t>These are numbers with a decimal point</a:t>
             </a:r>
           </a:p>
           <a:p>
@@ -8078,7 +8110,7 @@
               <a:rPr lang="en-US" altLang="en-US" dirty="0">
                 <a:latin typeface="Calibri" panose="020F0502020204030204" pitchFamily="34" charset="0"/>
               </a:rPr>
-              <a:t>Before you use a variable, you must also define it (tell Java what value it has)</a:t>
+              <a:t>A double has about 15 digits of accuracy</a:t>
             </a:r>
           </a:p>
           <a:p>
@@ -8087,10 +8119,10 @@
               <a:buChar char="o"/>
             </a:pPr>
             <a:r>
-              <a:rPr lang="en-US" dirty="0">
-                <a:latin typeface="Calibri" panose="020F0502020204030204" pitchFamily="34" charset="0"/>
-              </a:rPr>
-              <a:t>The variable name is combined with two words, the second word will start with an uppercase letter always</a:t>
+              <a:rPr lang="en-US" altLang="en-US" dirty="0">
+                <a:latin typeface="Calibri" panose="020F0502020204030204" pitchFamily="34" charset="0"/>
+              </a:rPr>
+              <a:t>If you just write a real number, such as 1.37, Java assumes it is a double</a:t>
             </a:r>
           </a:p>
           <a:p>
@@ -8102,124 +8134,7 @@
               <a:rPr lang="en-US" altLang="en-US" dirty="0">
                 <a:latin typeface="Calibri" panose="020F0502020204030204" pitchFamily="34" charset="0"/>
               </a:rPr>
-              <a:t>The value of a variable may change</a:t>
-            </a:r>
-            <a:endParaRPr lang="en-US" dirty="0">
-              <a:latin typeface="Calibri" panose="020F0502020204030204" pitchFamily="34" charset="0"/>
-            </a:endParaRPr>
-          </a:p>
-          <a:p>
-            <a:pPr>
-              <a:buFont typeface="Courier New" panose="02070309020205020404" pitchFamily="49" charset="0"/>
-              <a:buChar char="o"/>
-            </a:pPr>
-            <a:r>
-              <a:rPr lang="en-US" dirty="0" err="1">
-                <a:latin typeface="Calibri" panose="020F0502020204030204" pitchFamily="34" charset="0"/>
-              </a:rPr>
-              <a:t>E.g</a:t>
-            </a:r>
-            <a:r>
-              <a:rPr lang="en-US" dirty="0">
-                <a:latin typeface="Calibri" panose="020F0502020204030204" pitchFamily="34" charset="0"/>
-              </a:rPr>
-              <a:t>:</a:t>
-            </a:r>
-          </a:p>
-          <a:p>
-            <a:pPr lvl="1"/>
-            <a:r>
-              <a:rPr lang="en-US" altLang="en-US" dirty="0">
-                <a:latin typeface="Calibri" panose="020F0502020204030204" pitchFamily="34" charset="0"/>
-                <a:cs typeface="Calibri" panose="020F0502020204030204" pitchFamily="34" charset="0"/>
-              </a:rPr>
-              <a:t>int </a:t>
-            </a:r>
-            <a:r>
-              <a:rPr lang="en-US" altLang="en-US" dirty="0" err="1">
-                <a:latin typeface="Calibri" panose="020F0502020204030204" pitchFamily="34" charset="0"/>
-                <a:cs typeface="Calibri" panose="020F0502020204030204" pitchFamily="34" charset="0"/>
-              </a:rPr>
-              <a:t>classSize</a:t>
-            </a:r>
-            <a:r>
-              <a:rPr lang="en-US" altLang="en-US" dirty="0">
-                <a:latin typeface="Calibri" panose="020F0502020204030204" pitchFamily="34" charset="0"/>
-                <a:cs typeface="Calibri" panose="020F0502020204030204" pitchFamily="34" charset="0"/>
-              </a:rPr>
-              <a:t> = 10;</a:t>
-            </a:r>
-          </a:p>
-          <a:p>
-            <a:pPr lvl="1"/>
-            <a:r>
-              <a:rPr lang="en-US" altLang="en-US" dirty="0">
-                <a:latin typeface="Calibri" panose="020F0502020204030204" pitchFamily="34" charset="0"/>
-                <a:cs typeface="Calibri" panose="020F0502020204030204" pitchFamily="34" charset="0"/>
-              </a:rPr>
-              <a:t>double </a:t>
-            </a:r>
-            <a:r>
-              <a:rPr lang="en-US" altLang="en-US" dirty="0" err="1">
-                <a:latin typeface="Calibri" panose="020F0502020204030204" pitchFamily="34" charset="0"/>
-                <a:cs typeface="Calibri" panose="020F0502020204030204" pitchFamily="34" charset="0"/>
-              </a:rPr>
-              <a:t>myBankBalance</a:t>
-            </a:r>
-            <a:r>
-              <a:rPr lang="en-US" altLang="en-US" dirty="0">
-                <a:latin typeface="Calibri" panose="020F0502020204030204" pitchFamily="34" charset="0"/>
-                <a:cs typeface="Calibri" panose="020F0502020204030204" pitchFamily="34" charset="0"/>
-              </a:rPr>
-              <a:t> = 2000.37;</a:t>
-            </a:r>
-          </a:p>
-          <a:p>
-            <a:pPr lvl="1"/>
-            <a:r>
-              <a:rPr lang="en-US" altLang="en-US" dirty="0">
-                <a:latin typeface="Calibri" panose="020F0502020204030204" pitchFamily="34" charset="0"/>
-                <a:cs typeface="Calibri" panose="020F0502020204030204" pitchFamily="34" charset="0"/>
-              </a:rPr>
-              <a:t>int </a:t>
-            </a:r>
-            <a:r>
-              <a:rPr lang="en-US" altLang="en-US" dirty="0" err="1">
-                <a:latin typeface="Calibri" panose="020F0502020204030204" pitchFamily="34" charset="0"/>
-                <a:cs typeface="Calibri" panose="020F0502020204030204" pitchFamily="34" charset="0"/>
-              </a:rPr>
-              <a:t>myAge</a:t>
-            </a:r>
-            <a:r>
-              <a:rPr lang="en-US" altLang="en-US" dirty="0">
-                <a:latin typeface="Calibri" panose="020F0502020204030204" pitchFamily="34" charset="0"/>
-                <a:cs typeface="Calibri" panose="020F0502020204030204" pitchFamily="34" charset="0"/>
-              </a:rPr>
-              <a:t> = 30;</a:t>
-            </a:r>
-          </a:p>
-          <a:p>
-            <a:pPr lvl="1"/>
-            <a:r>
-              <a:rPr lang="en-US" altLang="en-US" dirty="0">
-                <a:latin typeface="Calibri" panose="020F0502020204030204" pitchFamily="34" charset="0"/>
-                <a:cs typeface="Calibri" panose="020F0502020204030204" pitchFamily="34" charset="0"/>
-              </a:rPr>
-              <a:t>float </a:t>
-            </a:r>
-            <a:r>
-              <a:rPr lang="en-US" altLang="en-US" dirty="0" err="1">
-                <a:latin typeface="Calibri" panose="020F0502020204030204" pitchFamily="34" charset="0"/>
-                <a:cs typeface="Calibri" panose="020F0502020204030204" pitchFamily="34" charset="0"/>
-              </a:rPr>
-              <a:t>speedometerReading</a:t>
-            </a:r>
-            <a:r>
-              <a:rPr lang="en-US" altLang="en-US" dirty="0">
-                <a:latin typeface="Calibri" panose="020F0502020204030204" pitchFamily="34" charset="0"/>
-                <a:cs typeface="Calibri" panose="020F0502020204030204" pitchFamily="34" charset="0"/>
-              </a:rPr>
-              <a:t> = 23456.4f;</a:t>
+              <a:t>Use double in preference to float</a:t>
             </a:r>
           </a:p>
           <a:p>

</xml_diff>